<commit_message>
Alg e Compl - Alg de Ordenação 01Set2025 ...
</commit_message>
<xml_diff>
--- a/01 Classes/Aula 05 - Algoritmos e Complexidade - Notação O e Função O.pptx
+++ b/01 Classes/Aula 05 - Algoritmos e Complexidade - Notação O e Função O.pptx
@@ -5,17 +5,18 @@
     <p:sldMasterId id="2147483648" r:id="rId1"/>
   </p:sldMasterIdLst>
   <p:notesMasterIdLst>
-    <p:notesMasterId r:id="rId10"/>
+    <p:notesMasterId r:id="rId11"/>
   </p:notesMasterIdLst>
   <p:sldIdLst>
     <p:sldId id="256" r:id="rId2"/>
     <p:sldId id="291" r:id="rId3"/>
     <p:sldId id="331" r:id="rId4"/>
-    <p:sldId id="333" r:id="rId5"/>
-    <p:sldId id="323" r:id="rId6"/>
-    <p:sldId id="334" r:id="rId7"/>
-    <p:sldId id="337" r:id="rId8"/>
-    <p:sldId id="309" r:id="rId9"/>
+    <p:sldId id="338" r:id="rId5"/>
+    <p:sldId id="333" r:id="rId6"/>
+    <p:sldId id="323" r:id="rId7"/>
+    <p:sldId id="334" r:id="rId8"/>
+    <p:sldId id="337" r:id="rId9"/>
+    <p:sldId id="309" r:id="rId10"/>
   </p:sldIdLst>
   <p:sldSz cx="9144000" cy="5143500" type="screen16x9"/>
   <p:notesSz cx="6858000" cy="9144000"/>
@@ -633,7 +634,13 @@
   <p:cSld>
     <p:spTree>
       <p:nvGrpSpPr>
-        <p:cNvPr id="1" name=""/>
+        <p:cNvPr id="1" name="">
+          <a:extLst>
+            <a:ext uri="{FF2B5EF4-FFF2-40B4-BE49-F238E27FC236}">
+              <a16:creationId xmlns:a16="http://schemas.microsoft.com/office/drawing/2014/main" id="{24791502-8F79-0D09-2BA2-3623C2AD38B9}"/>
+            </a:ext>
+          </a:extLst>
+        </p:cNvPr>
         <p:cNvGrpSpPr/>
         <p:nvPr/>
       </p:nvGrpSpPr>
@@ -647,7 +654,13 @@
       </p:grpSpPr>
       <p:sp>
         <p:nvSpPr>
-          <p:cNvPr id="2" name="Espaço Reservado para Imagem de Slide 1"/>
+          <p:cNvPr id="2" name="Espaço Reservado para Imagem de Slide 1">
+            <a:extLst>
+              <a:ext uri="{FF2B5EF4-FFF2-40B4-BE49-F238E27FC236}">
+                <a16:creationId xmlns:a16="http://schemas.microsoft.com/office/drawing/2014/main" id="{7B6751FC-AA98-CCA6-C4BB-890136C34D37}"/>
+              </a:ext>
+            </a:extLst>
+          </p:cNvPr>
           <p:cNvSpPr>
             <a:spLocks noGrp="1" noRot="1" noChangeAspect="1"/>
           </p:cNvSpPr>
@@ -664,7 +677,13 @@
       </p:sp>
       <p:sp>
         <p:nvSpPr>
-          <p:cNvPr id="3" name="Espaço Reservado para Anotações 2"/>
+          <p:cNvPr id="3" name="Espaço Reservado para Anotações 2">
+            <a:extLst>
+              <a:ext uri="{FF2B5EF4-FFF2-40B4-BE49-F238E27FC236}">
+                <a16:creationId xmlns:a16="http://schemas.microsoft.com/office/drawing/2014/main" id="{C34F6017-E5B9-3B1D-7017-27A32793F96E}"/>
+              </a:ext>
+            </a:extLst>
+          </p:cNvPr>
           <p:cNvSpPr>
             <a:spLocks noGrp="1"/>
           </p:cNvSpPr>
@@ -684,7 +703,7 @@
     </p:spTree>
     <p:extLst>
       <p:ext uri="{BB962C8B-B14F-4D97-AF65-F5344CB8AC3E}">
-        <p14:creationId xmlns:p14="http://schemas.microsoft.com/office/powerpoint/2010/main" val="585304384"/>
+        <p14:creationId xmlns:p14="http://schemas.microsoft.com/office/powerpoint/2010/main" val="2238233882"/>
       </p:ext>
     </p:extLst>
   </p:cSld>
@@ -750,7 +769,7 @@
     </p:spTree>
     <p:extLst>
       <p:ext uri="{BB962C8B-B14F-4D97-AF65-F5344CB8AC3E}">
-        <p14:creationId xmlns:p14="http://schemas.microsoft.com/office/powerpoint/2010/main" val="2709569597"/>
+        <p14:creationId xmlns:p14="http://schemas.microsoft.com/office/powerpoint/2010/main" val="585304384"/>
       </p:ext>
     </p:extLst>
   </p:cSld>
@@ -816,6 +835,72 @@
     </p:spTree>
     <p:extLst>
       <p:ext uri="{BB962C8B-B14F-4D97-AF65-F5344CB8AC3E}">
+        <p14:creationId xmlns:p14="http://schemas.microsoft.com/office/powerpoint/2010/main" val="2709569597"/>
+      </p:ext>
+    </p:extLst>
+  </p:cSld>
+  <p:clrMapOvr>
+    <a:masterClrMapping/>
+  </p:clrMapOvr>
+</p:notes>
+</file>
+
+<file path=ppt/notesSlides/notesSlide6.xml><?xml version="1.0" encoding="utf-8"?>
+<p:notes xmlns:a="http://schemas.openxmlformats.org/drawingml/2006/main" xmlns:r="http://schemas.openxmlformats.org/officeDocument/2006/relationships" xmlns:p="http://schemas.openxmlformats.org/presentationml/2006/main">
+  <p:cSld>
+    <p:spTree>
+      <p:nvGrpSpPr>
+        <p:cNvPr id="1" name=""/>
+        <p:cNvGrpSpPr/>
+        <p:nvPr/>
+      </p:nvGrpSpPr>
+      <p:grpSpPr>
+        <a:xfrm>
+          <a:off x="0" y="0"/>
+          <a:ext cx="0" cy="0"/>
+          <a:chOff x="0" y="0"/>
+          <a:chExt cx="0" cy="0"/>
+        </a:xfrm>
+      </p:grpSpPr>
+      <p:sp>
+        <p:nvSpPr>
+          <p:cNvPr id="2" name="Espaço Reservado para Imagem de Slide 1"/>
+          <p:cNvSpPr>
+            <a:spLocks noGrp="1" noRot="1" noChangeAspect="1"/>
+          </p:cNvSpPr>
+          <p:nvPr>
+            <p:ph type="sldImg"/>
+          </p:nvPr>
+        </p:nvSpPr>
+        <p:spPr>
+          <a:xfrm>
+            <a:off x="381000" y="685800"/>
+            <a:ext cx="6096000" cy="3429000"/>
+          </a:xfrm>
+        </p:spPr>
+      </p:sp>
+      <p:sp>
+        <p:nvSpPr>
+          <p:cNvPr id="3" name="Espaço Reservado para Anotações 2"/>
+          <p:cNvSpPr>
+            <a:spLocks noGrp="1"/>
+          </p:cNvSpPr>
+          <p:nvPr>
+            <p:ph type="body" idx="1"/>
+          </p:nvPr>
+        </p:nvSpPr>
+        <p:spPr/>
+        <p:txBody>
+          <a:bodyPr/>
+          <a:lstStyle/>
+          <a:p>
+            <a:endParaRPr lang="pt-BR" dirty="0"/>
+          </a:p>
+        </p:txBody>
+      </p:sp>
+    </p:spTree>
+    <p:extLst>
+      <p:ext uri="{BB962C8B-B14F-4D97-AF65-F5344CB8AC3E}">
         <p14:creationId xmlns:p14="http://schemas.microsoft.com/office/powerpoint/2010/main" val="2296249050"/>
       </p:ext>
     </p:extLst>
@@ -826,7 +911,7 @@
 </p:notes>
 </file>
 
-<file path=ppt/notesSlides/notesSlide6.xml><?xml version="1.0" encoding="utf-8"?>
+<file path=ppt/notesSlides/notesSlide7.xml><?xml version="1.0" encoding="utf-8"?>
 <p:notes xmlns:a="http://schemas.openxmlformats.org/drawingml/2006/main" xmlns:r="http://schemas.openxmlformats.org/officeDocument/2006/relationships" xmlns:p="http://schemas.openxmlformats.org/presentationml/2006/main">
   <p:cSld>
     <p:spTree>
@@ -3935,12 +4020,12 @@
               </a:rPr>
             </a:br>
             <a:r>
-              <a:rPr lang="pt-BR" b="1">
+              <a:rPr lang="pt-BR" b="1" dirty="0">
                 <a:solidFill>
                   <a:schemeClr val="bg1"/>
                 </a:solidFill>
               </a:rPr>
-              <a:t>Aula 03</a:t>
+              <a:t>Aula 05</a:t>
             </a:r>
             <a:br>
               <a:rPr lang="pt-BR" b="1" dirty="0">
@@ -3963,7 +4048,7 @@
                   <a:schemeClr val="bg1"/>
                 </a:solidFill>
               </a:rPr>
-              <a:t>Contextualização</a:t>
+              <a:t>Notação O e Função O</a:t>
             </a:r>
           </a:p>
         </p:txBody>
@@ -4360,13 +4445,16 @@
                   <a:srgbClr val="0070C0"/>
                 </a:solidFill>
               </a:rPr>
-              <a:t>Contextualização</a:t>
-            </a:r>
-            <a:endParaRPr lang="en-US" b="1" dirty="0">
-              <a:solidFill>
-                <a:srgbClr val="0070C0"/>
-              </a:solidFill>
-            </a:endParaRPr>
+              <a:t>Notação</a:t>
+            </a:r>
+            <a:r>
+              <a:rPr lang="en-US" b="1" dirty="0">
+                <a:solidFill>
+                  <a:srgbClr val="0070C0"/>
+                </a:solidFill>
+              </a:rPr>
+              <a:t> O</a:t>
+            </a:r>
           </a:p>
         </p:txBody>
       </p:sp>
@@ -4434,7 +4522,13 @@
   <p:cSld>
     <p:spTree>
       <p:nvGrpSpPr>
-        <p:cNvPr id="1" name=""/>
+        <p:cNvPr id="1" name="">
+          <a:extLst>
+            <a:ext uri="{FF2B5EF4-FFF2-40B4-BE49-F238E27FC236}">
+              <a16:creationId xmlns:a16="http://schemas.microsoft.com/office/drawing/2014/main" id="{8ADDCE32-251C-6918-CE89-29F459481C0B}"/>
+            </a:ext>
+          </a:extLst>
+        </p:cNvPr>
         <p:cNvGrpSpPr/>
         <p:nvPr/>
       </p:nvGrpSpPr>
@@ -4448,7 +4542,13 @@
       </p:grpSpPr>
       <p:sp>
         <p:nvSpPr>
-          <p:cNvPr id="6" name="Title 1"/>
+          <p:cNvPr id="6" name="Title 1">
+            <a:extLst>
+              <a:ext uri="{FF2B5EF4-FFF2-40B4-BE49-F238E27FC236}">
+                <a16:creationId xmlns:a16="http://schemas.microsoft.com/office/drawing/2014/main" id="{FF4973C1-E5A1-1FF3-28F6-5795AAE0317C}"/>
+              </a:ext>
+            </a:extLst>
+          </p:cNvPr>
           <p:cNvSpPr>
             <a:spLocks noGrp="1"/>
           </p:cNvSpPr>
@@ -4474,7 +4574,7 @@
                   <a:srgbClr val="0070C0"/>
                 </a:solidFill>
               </a:rPr>
-              <a:t>Leitura</a:t>
+              <a:t>Função</a:t>
             </a:r>
             <a:r>
               <a:rPr lang="en-US" b="1" dirty="0">
@@ -4482,27 +4582,20 @@
                   <a:srgbClr val="0070C0"/>
                 </a:solidFill>
               </a:rPr>
-              <a:t> </a:t>
-            </a:r>
-            <a:r>
-              <a:rPr lang="en-US" b="1" dirty="0" err="1">
-                <a:solidFill>
-                  <a:srgbClr val="0070C0"/>
-                </a:solidFill>
-              </a:rPr>
-              <a:t>Específica</a:t>
-            </a:r>
-            <a:endParaRPr lang="en-US" b="1" dirty="0">
-              <a:solidFill>
-                <a:srgbClr val="0070C0"/>
-              </a:solidFill>
-            </a:endParaRPr>
+              <a:t> O</a:t>
+            </a:r>
           </a:p>
         </p:txBody>
       </p:sp>
       <p:sp>
         <p:nvSpPr>
-          <p:cNvPr id="8" name="Text Placeholder 2"/>
+          <p:cNvPr id="8" name="Text Placeholder 2">
+            <a:extLst>
+              <a:ext uri="{FF2B5EF4-FFF2-40B4-BE49-F238E27FC236}">
+                <a16:creationId xmlns:a16="http://schemas.microsoft.com/office/drawing/2014/main" id="{27209387-B7DC-5C02-A2EA-5BE654A32B0F}"/>
+              </a:ext>
+            </a:extLst>
+          </p:cNvPr>
           <p:cNvSpPr>
             <a:spLocks noGrp="1"/>
           </p:cNvSpPr>
@@ -4513,7 +4606,7 @@
         <p:spPr>
           <a:xfrm>
             <a:off x="142865" y="1200150"/>
-            <a:ext cx="8865056" cy="3737369"/>
+            <a:ext cx="8865056" cy="3737370"/>
           </a:xfrm>
         </p:spPr>
         <p:txBody>
@@ -4530,69 +4623,25 @@
                 <a:latin typeface="Times New Roman" panose="02020603050405020304" pitchFamily="18" charset="0"/>
                 <a:cs typeface="Times New Roman" panose="02020603050405020304" pitchFamily="18" charset="0"/>
               </a:rPr>
-              <a:t>[1] Algoritmos e Complexidade – Parte 1.</a:t>
-            </a:r>
-          </a:p>
-          <a:p>
-            <a:pPr marL="0" indent="0" algn="just">
-              <a:buNone/>
-            </a:pPr>
-            <a:r>
-              <a:rPr lang="pt-BR" sz="2000" b="1" dirty="0">
+              <a:t>Algoritmos e Complexidade</a:t>
+            </a:r>
+            <a:r>
+              <a:rPr lang="pt-BR" sz="2000" dirty="0">
                 <a:solidFill>
-                  <a:srgbClr val="FF0000"/>
+                  <a:schemeClr val="tx1"/>
                 </a:solidFill>
                 <a:latin typeface="Times New Roman" panose="02020603050405020304" pitchFamily="18" charset="0"/>
                 <a:cs typeface="Times New Roman" panose="02020603050405020304" pitchFamily="18" charset="0"/>
               </a:rPr>
-              <a:t>Disponível em:</a:t>
-            </a:r>
-          </a:p>
-          <a:p>
-            <a:pPr marL="0" indent="0" algn="just">
-              <a:buNone/>
-            </a:pPr>
-            <a:endParaRPr lang="pt-BR" sz="2000" dirty="0">
-              <a:latin typeface="Times New Roman" panose="02020603050405020304" pitchFamily="18" charset="0"/>
-              <a:cs typeface="Times New Roman" panose="02020603050405020304" pitchFamily="18" charset="0"/>
-            </a:endParaRPr>
-          </a:p>
-          <a:p>
-            <a:pPr marL="0" indent="0" algn="just">
-              <a:buNone/>
-            </a:pPr>
-            <a:r>
-              <a:rPr lang="pt-BR" sz="2000" dirty="0">
-                <a:latin typeface="Times New Roman" panose="02020603050405020304" pitchFamily="18" charset="0"/>
-                <a:cs typeface="Times New Roman" panose="02020603050405020304" pitchFamily="18" charset="0"/>
-              </a:rPr>
-              <a:t>[2] Algoritmos e Complexidade – Parte 2. </a:t>
-            </a:r>
-          </a:p>
-          <a:p>
-            <a:pPr marL="0" indent="0" algn="just">
-              <a:buNone/>
-            </a:pPr>
-            <a:r>
-              <a:rPr lang="pt-BR" sz="2000" b="1" dirty="0">
-                <a:solidFill>
-                  <a:srgbClr val="FF0000"/>
-                </a:solidFill>
-                <a:latin typeface="Times New Roman" panose="02020603050405020304" pitchFamily="18" charset="0"/>
-                <a:cs typeface="Times New Roman" panose="02020603050405020304" pitchFamily="18" charset="0"/>
-              </a:rPr>
-              <a:t>Disponível em:</a:t>
-            </a:r>
-            <a:endParaRPr lang="pt-BR" sz="2000" dirty="0">
-              <a:latin typeface="Calibri" panose="020F0502020204030204" pitchFamily="34" charset="0"/>
-            </a:endParaRPr>
+              <a:t> ...</a:t>
+            </a:r>
           </a:p>
         </p:txBody>
       </p:sp>
     </p:spTree>
     <p:extLst>
       <p:ext uri="{BB962C8B-B14F-4D97-AF65-F5344CB8AC3E}">
-        <p14:creationId xmlns:p14="http://schemas.microsoft.com/office/powerpoint/2010/main" val="3680270425"/>
+        <p14:creationId xmlns:p14="http://schemas.microsoft.com/office/powerpoint/2010/main" val="1296605834"/>
       </p:ext>
     </p:extLst>
   </p:cSld>
@@ -4648,7 +4697,7 @@
                   <a:srgbClr val="0070C0"/>
                 </a:solidFill>
               </a:rPr>
-              <a:t>Aprenda</a:t>
+              <a:t>Leitura</a:t>
             </a:r>
             <a:r>
               <a:rPr lang="en-US" b="1" dirty="0">
@@ -4656,8 +4705,21 @@
                   <a:srgbClr val="0070C0"/>
                 </a:solidFill>
               </a:rPr>
-              <a:t>+</a:t>
-            </a:r>
+              <a:t> </a:t>
+            </a:r>
+            <a:r>
+              <a:rPr lang="en-US" b="1" dirty="0" err="1">
+                <a:solidFill>
+                  <a:srgbClr val="0070C0"/>
+                </a:solidFill>
+              </a:rPr>
+              <a:t>Específica</a:t>
+            </a:r>
+            <a:endParaRPr lang="en-US" b="1" dirty="0">
+              <a:solidFill>
+                <a:srgbClr val="0070C0"/>
+              </a:solidFill>
+            </a:endParaRPr>
           </a:p>
         </p:txBody>
       </p:sp>
@@ -4674,7 +4736,7 @@
         <p:spPr>
           <a:xfrm>
             <a:off x="142865" y="1200150"/>
-            <a:ext cx="8865056" cy="3737370"/>
+            <a:ext cx="8865056" cy="3737369"/>
           </a:xfrm>
         </p:spPr>
         <p:txBody>
@@ -4687,11 +4749,11 @@
               <a:buNone/>
             </a:pPr>
             <a:r>
-              <a:rPr lang="pt-BR" sz="2400" dirty="0">
+              <a:rPr lang="pt-BR" sz="2000" dirty="0">
                 <a:latin typeface="Times New Roman" panose="02020603050405020304" pitchFamily="18" charset="0"/>
                 <a:cs typeface="Times New Roman" panose="02020603050405020304" pitchFamily="18" charset="0"/>
               </a:rPr>
-              <a:t>[1] Algoritmos e Complexidade – Parte 1</a:t>
+              <a:t>[1] Algoritmos e Complexidade – Parte 1.</a:t>
             </a:r>
           </a:p>
           <a:p>
@@ -4699,24 +4761,21 @@
               <a:buNone/>
             </a:pPr>
             <a:r>
-              <a:rPr lang="pt-BR" sz="2400" b="1" dirty="0">
+              <a:rPr lang="pt-BR" sz="2000" b="1" dirty="0">
                 <a:solidFill>
                   <a:srgbClr val="FF0000"/>
                 </a:solidFill>
                 <a:latin typeface="Times New Roman" panose="02020603050405020304" pitchFamily="18" charset="0"/>
                 <a:cs typeface="Times New Roman" panose="02020603050405020304" pitchFamily="18" charset="0"/>
               </a:rPr>
-              <a:t>Disponível em: </a:t>
-            </a:r>
-            <a:r>
-              <a:rPr lang="pt-BR" sz="2400" dirty="0">
-                <a:latin typeface="Times New Roman" panose="02020603050405020304" pitchFamily="18" charset="0"/>
-                <a:cs typeface="Times New Roman" panose="02020603050405020304" pitchFamily="18" charset="0"/>
-                <a:hlinkClick r:id="rId3"/>
-              </a:rPr>
-              <a:t>https://</a:t>
-            </a:r>
-            <a:endParaRPr lang="pt-BR" sz="2400" dirty="0">
+              <a:t>Disponível em:</a:t>
+            </a:r>
+          </a:p>
+          <a:p>
+            <a:pPr marL="0" indent="0" algn="just">
+              <a:buNone/>
+            </a:pPr>
+            <a:endParaRPr lang="pt-BR" sz="2000" dirty="0">
               <a:latin typeface="Times New Roman" panose="02020603050405020304" pitchFamily="18" charset="0"/>
               <a:cs typeface="Times New Roman" panose="02020603050405020304" pitchFamily="18" charset="0"/>
             </a:endParaRPr>
@@ -4725,57 +4784,30 @@
             <a:pPr marL="0" indent="0" algn="just">
               <a:buNone/>
             </a:pPr>
-            <a:endParaRPr lang="pt-BR" sz="2400" dirty="0">
-              <a:latin typeface="Times New Roman" panose="02020603050405020304" pitchFamily="18" charset="0"/>
-              <a:cs typeface="Times New Roman" panose="02020603050405020304" pitchFamily="18" charset="0"/>
-            </a:endParaRPr>
+            <a:r>
+              <a:rPr lang="pt-BR" sz="2000" dirty="0">
+                <a:latin typeface="Times New Roman" panose="02020603050405020304" pitchFamily="18" charset="0"/>
+                <a:cs typeface="Times New Roman" panose="02020603050405020304" pitchFamily="18" charset="0"/>
+              </a:rPr>
+              <a:t>[2] Algoritmos e Complexidade – Parte 2. </a:t>
+            </a:r>
           </a:p>
           <a:p>
             <a:pPr marL="0" indent="0" algn="just">
               <a:buNone/>
             </a:pPr>
             <a:r>
-              <a:rPr lang="pt-BR" sz="2400" dirty="0">
-                <a:latin typeface="Times New Roman" panose="02020603050405020304" pitchFamily="18" charset="0"/>
-                <a:cs typeface="Times New Roman" panose="02020603050405020304" pitchFamily="18" charset="0"/>
-              </a:rPr>
-              <a:t>[2] Algoritmos e Complexidade – Parte 2</a:t>
-            </a:r>
-          </a:p>
-          <a:p>
-            <a:pPr marL="0" indent="0" algn="just">
-              <a:buNone/>
-            </a:pPr>
-            <a:r>
-              <a:rPr lang="pt-BR" sz="2400" b="1" dirty="0">
+              <a:rPr lang="pt-BR" sz="2000" b="1" dirty="0">
                 <a:solidFill>
                   <a:srgbClr val="FF0000"/>
                 </a:solidFill>
                 <a:latin typeface="Times New Roman" panose="02020603050405020304" pitchFamily="18" charset="0"/>
                 <a:cs typeface="Times New Roman" panose="02020603050405020304" pitchFamily="18" charset="0"/>
               </a:rPr>
-              <a:t>Disponível em: </a:t>
-            </a:r>
-            <a:r>
-              <a:rPr lang="pt-BR" sz="2400" dirty="0">
-                <a:latin typeface="Times New Roman" panose="02020603050405020304" pitchFamily="18" charset="0"/>
-                <a:cs typeface="Times New Roman" panose="02020603050405020304" pitchFamily="18" charset="0"/>
-                <a:hlinkClick r:id="rId4"/>
-              </a:rPr>
-              <a:t>https://</a:t>
-            </a:r>
-            <a:endParaRPr lang="pt-BR" sz="2400" dirty="0">
-              <a:latin typeface="Times New Roman" panose="02020603050405020304" pitchFamily="18" charset="0"/>
-              <a:cs typeface="Times New Roman" panose="02020603050405020304" pitchFamily="18" charset="0"/>
-            </a:endParaRPr>
-          </a:p>
-          <a:p>
-            <a:pPr marL="0" indent="0" algn="just">
-              <a:buNone/>
-            </a:pPr>
-            <a:endParaRPr lang="pt-BR" sz="2400" dirty="0">
-              <a:latin typeface="Times New Roman" panose="02020603050405020304" pitchFamily="18" charset="0"/>
-              <a:cs typeface="Times New Roman" panose="02020603050405020304" pitchFamily="18" charset="0"/>
+              <a:t>Disponível em:</a:t>
+            </a:r>
+            <a:endParaRPr lang="pt-BR" sz="2000" dirty="0">
+              <a:latin typeface="Calibri" panose="020F0502020204030204" pitchFamily="34" charset="0"/>
             </a:endParaRPr>
           </a:p>
         </p:txBody>
@@ -4783,7 +4815,7 @@
     </p:spTree>
     <p:extLst>
       <p:ext uri="{BB962C8B-B14F-4D97-AF65-F5344CB8AC3E}">
-        <p14:creationId xmlns:p14="http://schemas.microsoft.com/office/powerpoint/2010/main" val="2747596967"/>
+        <p14:creationId xmlns:p14="http://schemas.microsoft.com/office/powerpoint/2010/main" val="3680270425"/>
       </p:ext>
     </p:extLst>
   </p:cSld>
@@ -4839,7 +4871,7 @@
                   <a:srgbClr val="0070C0"/>
                 </a:solidFill>
               </a:rPr>
-              <a:t>Dinâmica</a:t>
+              <a:t>Aprenda</a:t>
             </a:r>
             <a:r>
               <a:rPr lang="en-US" b="1" dirty="0">
@@ -4847,21 +4879,8 @@
                   <a:srgbClr val="0070C0"/>
                 </a:solidFill>
               </a:rPr>
-              <a:t>/</a:t>
-            </a:r>
-            <a:r>
-              <a:rPr lang="en-US" b="1" dirty="0" err="1">
-                <a:solidFill>
-                  <a:srgbClr val="0070C0"/>
-                </a:solidFill>
-              </a:rPr>
-              <a:t>Atividades</a:t>
-            </a:r>
-            <a:endParaRPr lang="en-US" b="1" dirty="0">
-              <a:solidFill>
-                <a:srgbClr val="0070C0"/>
-              </a:solidFill>
-            </a:endParaRPr>
+              <a:t>+</a:t>
+            </a:r>
           </a:p>
         </p:txBody>
       </p:sp>
@@ -4877,8 +4896,8 @@
         </p:nvSpPr>
         <p:spPr>
           <a:xfrm>
-            <a:off x="139472" y="1063230"/>
-            <a:ext cx="8865056" cy="3606305"/>
+            <a:off x="142865" y="1200150"/>
+            <a:ext cx="8865056" cy="3737370"/>
           </a:xfrm>
         </p:spPr>
         <p:txBody>
@@ -4887,43 +4906,99 @@
           </a:bodyPr>
           <a:lstStyle/>
           <a:p>
-            <a:pPr algn="just">
-              <a:buFont typeface="Wingdings" panose="05000000000000000000" pitchFamily="2" charset="2"/>
-              <a:buChar char="§"/>
-            </a:pPr>
-            <a:r>
-              <a:rPr lang="pt-BR" dirty="0">
-                <a:latin typeface="Times New Roman" panose="02020603050405020304" pitchFamily="18" charset="0"/>
-                <a:cs typeface="Times New Roman" panose="02020603050405020304" pitchFamily="18" charset="0"/>
-              </a:rPr>
-              <a:t>	Exercícios (Atividade Verificadora de Aprendizagem)</a:t>
-            </a:r>
-          </a:p>
-          <a:p>
             <a:pPr marL="0" indent="0" algn="just">
               <a:buNone/>
             </a:pPr>
-            <a:r>
-              <a:rPr lang="pt-BR" dirty="0">
-                <a:latin typeface="Times New Roman" panose="02020603050405020304" pitchFamily="18" charset="0"/>
-                <a:cs typeface="Times New Roman" panose="02020603050405020304" pitchFamily="18" charset="0"/>
-              </a:rPr>
-              <a:t> </a:t>
-            </a:r>
             <a:r>
               <a:rPr lang="pt-BR" sz="2400" dirty="0">
                 <a:latin typeface="Times New Roman" panose="02020603050405020304" pitchFamily="18" charset="0"/>
                 <a:cs typeface="Times New Roman" panose="02020603050405020304" pitchFamily="18" charset="0"/>
               </a:rPr>
-              <a:t>	</a:t>
+              <a:t>[1] Algoritmos e Complexidade – Parte 1</a:t>
             </a:r>
           </a:p>
           <a:p>
             <a:pPr marL="0" indent="0" algn="just">
               <a:buNone/>
             </a:pPr>
-            <a:endParaRPr lang="pt-BR" sz="2000" dirty="0">
-              <a:latin typeface="Calibri" panose="020F0502020204030204" pitchFamily="34" charset="0"/>
+            <a:r>
+              <a:rPr lang="pt-BR" sz="2400" b="1" dirty="0">
+                <a:solidFill>
+                  <a:srgbClr val="FF0000"/>
+                </a:solidFill>
+                <a:latin typeface="Times New Roman" panose="02020603050405020304" pitchFamily="18" charset="0"/>
+                <a:cs typeface="Times New Roman" panose="02020603050405020304" pitchFamily="18" charset="0"/>
+              </a:rPr>
+              <a:t>Disponível em: </a:t>
+            </a:r>
+            <a:r>
+              <a:rPr lang="pt-BR" sz="2400" dirty="0">
+                <a:latin typeface="Times New Roman" panose="02020603050405020304" pitchFamily="18" charset="0"/>
+                <a:cs typeface="Times New Roman" panose="02020603050405020304" pitchFamily="18" charset="0"/>
+                <a:hlinkClick r:id="rId3"/>
+              </a:rPr>
+              <a:t>https://</a:t>
+            </a:r>
+            <a:endParaRPr lang="pt-BR" sz="2400" dirty="0">
+              <a:latin typeface="Times New Roman" panose="02020603050405020304" pitchFamily="18" charset="0"/>
+              <a:cs typeface="Times New Roman" panose="02020603050405020304" pitchFamily="18" charset="0"/>
+            </a:endParaRPr>
+          </a:p>
+          <a:p>
+            <a:pPr marL="0" indent="0" algn="just">
+              <a:buNone/>
+            </a:pPr>
+            <a:endParaRPr lang="pt-BR" sz="2400" dirty="0">
+              <a:latin typeface="Times New Roman" panose="02020603050405020304" pitchFamily="18" charset="0"/>
+              <a:cs typeface="Times New Roman" panose="02020603050405020304" pitchFamily="18" charset="0"/>
+            </a:endParaRPr>
+          </a:p>
+          <a:p>
+            <a:pPr marL="0" indent="0" algn="just">
+              <a:buNone/>
+            </a:pPr>
+            <a:r>
+              <a:rPr lang="pt-BR" sz="2400" dirty="0">
+                <a:latin typeface="Times New Roman" panose="02020603050405020304" pitchFamily="18" charset="0"/>
+                <a:cs typeface="Times New Roman" panose="02020603050405020304" pitchFamily="18" charset="0"/>
+              </a:rPr>
+              <a:t>[2] Algoritmos e Complexidade – Parte 2</a:t>
+            </a:r>
+          </a:p>
+          <a:p>
+            <a:pPr marL="0" indent="0" algn="just">
+              <a:buNone/>
+            </a:pPr>
+            <a:r>
+              <a:rPr lang="pt-BR" sz="2400" b="1" dirty="0">
+                <a:solidFill>
+                  <a:srgbClr val="FF0000"/>
+                </a:solidFill>
+                <a:latin typeface="Times New Roman" panose="02020603050405020304" pitchFamily="18" charset="0"/>
+                <a:cs typeface="Times New Roman" panose="02020603050405020304" pitchFamily="18" charset="0"/>
+              </a:rPr>
+              <a:t>Disponível em: </a:t>
+            </a:r>
+            <a:r>
+              <a:rPr lang="pt-BR" sz="2400" dirty="0">
+                <a:latin typeface="Times New Roman" panose="02020603050405020304" pitchFamily="18" charset="0"/>
+                <a:cs typeface="Times New Roman" panose="02020603050405020304" pitchFamily="18" charset="0"/>
+                <a:hlinkClick r:id="rId4"/>
+              </a:rPr>
+              <a:t>https://</a:t>
+            </a:r>
+            <a:endParaRPr lang="pt-BR" sz="2400" dirty="0">
+              <a:latin typeface="Times New Roman" panose="02020603050405020304" pitchFamily="18" charset="0"/>
+              <a:cs typeface="Times New Roman" panose="02020603050405020304" pitchFamily="18" charset="0"/>
+            </a:endParaRPr>
+          </a:p>
+          <a:p>
+            <a:pPr marL="0" indent="0" algn="just">
+              <a:buNone/>
+            </a:pPr>
+            <a:endParaRPr lang="pt-BR" sz="2400" dirty="0">
+              <a:latin typeface="Times New Roman" panose="02020603050405020304" pitchFamily="18" charset="0"/>
+              <a:cs typeface="Times New Roman" panose="02020603050405020304" pitchFamily="18" charset="0"/>
             </a:endParaRPr>
           </a:p>
         </p:txBody>
@@ -4931,7 +5006,7 @@
     </p:spTree>
     <p:extLst>
       <p:ext uri="{BB962C8B-B14F-4D97-AF65-F5344CB8AC3E}">
-        <p14:creationId xmlns:p14="http://schemas.microsoft.com/office/powerpoint/2010/main" val="2470652989"/>
+        <p14:creationId xmlns:p14="http://schemas.microsoft.com/office/powerpoint/2010/main" val="2747596967"/>
       </p:ext>
     </p:extLst>
   </p:cSld>
@@ -4987,6 +5062,154 @@
                   <a:srgbClr val="0070C0"/>
                 </a:solidFill>
               </a:rPr>
+              <a:t>Dinâmica</a:t>
+            </a:r>
+            <a:r>
+              <a:rPr lang="en-US" b="1" dirty="0">
+                <a:solidFill>
+                  <a:srgbClr val="0070C0"/>
+                </a:solidFill>
+              </a:rPr>
+              <a:t>/</a:t>
+            </a:r>
+            <a:r>
+              <a:rPr lang="en-US" b="1" dirty="0" err="1">
+                <a:solidFill>
+                  <a:srgbClr val="0070C0"/>
+                </a:solidFill>
+              </a:rPr>
+              <a:t>Atividades</a:t>
+            </a:r>
+            <a:endParaRPr lang="en-US" b="1" dirty="0">
+              <a:solidFill>
+                <a:srgbClr val="0070C0"/>
+              </a:solidFill>
+            </a:endParaRPr>
+          </a:p>
+        </p:txBody>
+      </p:sp>
+      <p:sp>
+        <p:nvSpPr>
+          <p:cNvPr id="8" name="Text Placeholder 2"/>
+          <p:cNvSpPr>
+            <a:spLocks noGrp="1"/>
+          </p:cNvSpPr>
+          <p:nvPr>
+            <p:ph type="body" sz="half" idx="1"/>
+          </p:nvPr>
+        </p:nvSpPr>
+        <p:spPr>
+          <a:xfrm>
+            <a:off x="139472" y="1063230"/>
+            <a:ext cx="8865056" cy="3606305"/>
+          </a:xfrm>
+        </p:spPr>
+        <p:txBody>
+          <a:bodyPr>
+            <a:noAutofit/>
+          </a:bodyPr>
+          <a:lstStyle/>
+          <a:p>
+            <a:pPr algn="just">
+              <a:buFont typeface="Wingdings" panose="05000000000000000000" pitchFamily="2" charset="2"/>
+              <a:buChar char="§"/>
+            </a:pPr>
+            <a:r>
+              <a:rPr lang="pt-BR" dirty="0">
+                <a:latin typeface="Times New Roman" panose="02020603050405020304" pitchFamily="18" charset="0"/>
+                <a:cs typeface="Times New Roman" panose="02020603050405020304" pitchFamily="18" charset="0"/>
+              </a:rPr>
+              <a:t>	Exercícios (Atividade Verificadora de Aprendizagem)</a:t>
+            </a:r>
+          </a:p>
+          <a:p>
+            <a:pPr marL="0" indent="0" algn="just">
+              <a:buNone/>
+            </a:pPr>
+            <a:r>
+              <a:rPr lang="pt-BR" dirty="0">
+                <a:latin typeface="Times New Roman" panose="02020603050405020304" pitchFamily="18" charset="0"/>
+                <a:cs typeface="Times New Roman" panose="02020603050405020304" pitchFamily="18" charset="0"/>
+              </a:rPr>
+              <a:t> </a:t>
+            </a:r>
+            <a:r>
+              <a:rPr lang="pt-BR" sz="2400" dirty="0">
+                <a:latin typeface="Times New Roman" panose="02020603050405020304" pitchFamily="18" charset="0"/>
+                <a:cs typeface="Times New Roman" panose="02020603050405020304" pitchFamily="18" charset="0"/>
+              </a:rPr>
+              <a:t>	</a:t>
+            </a:r>
+          </a:p>
+          <a:p>
+            <a:pPr marL="0" indent="0" algn="just">
+              <a:buNone/>
+            </a:pPr>
+            <a:endParaRPr lang="pt-BR" sz="2000" dirty="0">
+              <a:latin typeface="Calibri" panose="020F0502020204030204" pitchFamily="34" charset="0"/>
+            </a:endParaRPr>
+          </a:p>
+        </p:txBody>
+      </p:sp>
+    </p:spTree>
+    <p:extLst>
+      <p:ext uri="{BB962C8B-B14F-4D97-AF65-F5344CB8AC3E}">
+        <p14:creationId xmlns:p14="http://schemas.microsoft.com/office/powerpoint/2010/main" val="2470652989"/>
+      </p:ext>
+    </p:extLst>
+  </p:cSld>
+  <p:clrMapOvr>
+    <a:masterClrMapping/>
+  </p:clrMapOvr>
+  <p:transition spd="med"/>
+</p:sld>
+</file>
+
+<file path=ppt/slides/slide8.xml><?xml version="1.0" encoding="utf-8"?>
+<p:sld xmlns:a="http://schemas.openxmlformats.org/drawingml/2006/main" xmlns:r="http://schemas.openxmlformats.org/officeDocument/2006/relationships" xmlns:p="http://schemas.openxmlformats.org/presentationml/2006/main">
+  <p:cSld>
+    <p:spTree>
+      <p:nvGrpSpPr>
+        <p:cNvPr id="1" name=""/>
+        <p:cNvGrpSpPr/>
+        <p:nvPr/>
+      </p:nvGrpSpPr>
+      <p:grpSpPr>
+        <a:xfrm>
+          <a:off x="0" y="0"/>
+          <a:ext cx="0" cy="0"/>
+          <a:chOff x="0" y="0"/>
+          <a:chExt cx="0" cy="0"/>
+        </a:xfrm>
+      </p:grpSpPr>
+      <p:sp>
+        <p:nvSpPr>
+          <p:cNvPr id="6" name="Title 1"/>
+          <p:cNvSpPr>
+            <a:spLocks noGrp="1"/>
+          </p:cNvSpPr>
+          <p:nvPr>
+            <p:ph type="title"/>
+          </p:nvPr>
+        </p:nvSpPr>
+        <p:spPr>
+          <a:xfrm>
+            <a:off x="457200" y="205980"/>
+            <a:ext cx="8229600" cy="857251"/>
+          </a:xfrm>
+        </p:spPr>
+        <p:txBody>
+          <a:bodyPr>
+            <a:normAutofit/>
+          </a:bodyPr>
+          <a:lstStyle/>
+          <a:p>
+            <a:r>
+              <a:rPr lang="en-US" b="1" dirty="0" err="1">
+                <a:solidFill>
+                  <a:srgbClr val="0070C0"/>
+                </a:solidFill>
+              </a:rPr>
               <a:t>Referências</a:t>
             </a:r>
             <a:r>
@@ -5088,7 +5311,7 @@
 </p:sld>
 </file>
 
-<file path=ppt/slides/slide8.xml><?xml version="1.0" encoding="utf-8"?>
+<file path=ppt/slides/slide9.xml><?xml version="1.0" encoding="utf-8"?>
 <p:sld xmlns:a="http://schemas.openxmlformats.org/drawingml/2006/main" xmlns:r="http://schemas.openxmlformats.org/officeDocument/2006/relationships" xmlns:p="http://schemas.openxmlformats.org/presentationml/2006/main">
   <p:cSld>
     <p:spTree>

</xml_diff>

<commit_message>
Aula Algo e Compl 10Set2025 ...
</commit_message>
<xml_diff>
--- a/01 Classes/Aula 05 - Algoritmos e Complexidade - Notação O e Função O.pptx
+++ b/01 Classes/Aula 05 - Algoritmos e Complexidade - Notação O e Função O.pptx
@@ -5,7 +5,7 @@
     <p:sldMasterId id="2147483648" r:id="rId1"/>
   </p:sldMasterIdLst>
   <p:notesMasterIdLst>
-    <p:notesMasterId r:id="rId39"/>
+    <p:notesMasterId r:id="rId38"/>
   </p:notesMasterIdLst>
   <p:sldIdLst>
     <p:sldId id="256" r:id="rId2"/>
@@ -32,19 +32,18 @@
     <p:sldId id="346" r:id="rId23"/>
     <p:sldId id="348" r:id="rId24"/>
     <p:sldId id="349" r:id="rId25"/>
-    <p:sldId id="347" r:id="rId26"/>
-    <p:sldId id="350" r:id="rId27"/>
-    <p:sldId id="351" r:id="rId28"/>
-    <p:sldId id="352" r:id="rId29"/>
-    <p:sldId id="353" r:id="rId30"/>
-    <p:sldId id="354" r:id="rId31"/>
-    <p:sldId id="355" r:id="rId32"/>
-    <p:sldId id="356" r:id="rId33"/>
-    <p:sldId id="357" r:id="rId34"/>
-    <p:sldId id="358" r:id="rId35"/>
-    <p:sldId id="337" r:id="rId36"/>
-    <p:sldId id="359" r:id="rId37"/>
-    <p:sldId id="309" r:id="rId38"/>
+    <p:sldId id="350" r:id="rId26"/>
+    <p:sldId id="351" r:id="rId27"/>
+    <p:sldId id="352" r:id="rId28"/>
+    <p:sldId id="353" r:id="rId29"/>
+    <p:sldId id="354" r:id="rId30"/>
+    <p:sldId id="355" r:id="rId31"/>
+    <p:sldId id="356" r:id="rId32"/>
+    <p:sldId id="357" r:id="rId33"/>
+    <p:sldId id="358" r:id="rId34"/>
+    <p:sldId id="337" r:id="rId35"/>
+    <p:sldId id="359" r:id="rId36"/>
+    <p:sldId id="309" r:id="rId37"/>
   </p:sldIdLst>
   <p:sldSz cx="9144000" cy="5143500" type="screen16x9"/>
   <p:notesSz cx="6858000" cy="9144000"/>
@@ -1787,90 +1786,6 @@
         <p:cNvPr id="1" name="">
           <a:extLst>
             <a:ext uri="{FF2B5EF4-FFF2-40B4-BE49-F238E27FC236}">
-              <a16:creationId xmlns:a16="http://schemas.microsoft.com/office/drawing/2014/main" id="{B70089F3-42A4-93E0-8283-95D1AA09B6D3}"/>
-            </a:ext>
-          </a:extLst>
-        </p:cNvPr>
-        <p:cNvGrpSpPr/>
-        <p:nvPr/>
-      </p:nvGrpSpPr>
-      <p:grpSpPr>
-        <a:xfrm>
-          <a:off x="0" y="0"/>
-          <a:ext cx="0" cy="0"/>
-          <a:chOff x="0" y="0"/>
-          <a:chExt cx="0" cy="0"/>
-        </a:xfrm>
-      </p:grpSpPr>
-      <p:sp>
-        <p:nvSpPr>
-          <p:cNvPr id="2" name="Espaço Reservado para Imagem de Slide 1">
-            <a:extLst>
-              <a:ext uri="{FF2B5EF4-FFF2-40B4-BE49-F238E27FC236}">
-                <a16:creationId xmlns:a16="http://schemas.microsoft.com/office/drawing/2014/main" id="{6F0E0A51-3177-5C55-BEB5-E19EB3921A8D}"/>
-              </a:ext>
-            </a:extLst>
-          </p:cNvPr>
-          <p:cNvSpPr>
-            <a:spLocks noGrp="1" noRot="1" noChangeAspect="1"/>
-          </p:cNvSpPr>
-          <p:nvPr>
-            <p:ph type="sldImg"/>
-          </p:nvPr>
-        </p:nvSpPr>
-        <p:spPr>
-          <a:xfrm>
-            <a:off x="381000" y="685800"/>
-            <a:ext cx="6096000" cy="3429000"/>
-          </a:xfrm>
-        </p:spPr>
-      </p:sp>
-      <p:sp>
-        <p:nvSpPr>
-          <p:cNvPr id="3" name="Espaço Reservado para Anotações 2">
-            <a:extLst>
-              <a:ext uri="{FF2B5EF4-FFF2-40B4-BE49-F238E27FC236}">
-                <a16:creationId xmlns:a16="http://schemas.microsoft.com/office/drawing/2014/main" id="{9CA0E368-8B8D-A192-9B71-286E358E0751}"/>
-              </a:ext>
-            </a:extLst>
-          </p:cNvPr>
-          <p:cNvSpPr>
-            <a:spLocks noGrp="1"/>
-          </p:cNvSpPr>
-          <p:nvPr>
-            <p:ph type="body" idx="1"/>
-          </p:nvPr>
-        </p:nvSpPr>
-        <p:spPr/>
-        <p:txBody>
-          <a:bodyPr/>
-          <a:lstStyle/>
-          <a:p>
-            <a:endParaRPr lang="pt-BR" dirty="0"/>
-          </a:p>
-        </p:txBody>
-      </p:sp>
-    </p:spTree>
-    <p:extLst>
-      <p:ext uri="{BB962C8B-B14F-4D97-AF65-F5344CB8AC3E}">
-        <p14:creationId xmlns:p14="http://schemas.microsoft.com/office/powerpoint/2010/main" val="119121648"/>
-      </p:ext>
-    </p:extLst>
-  </p:cSld>
-  <p:clrMapOvr>
-    <a:masterClrMapping/>
-  </p:clrMapOvr>
-</p:notes>
-</file>
-
-<file path=ppt/notesSlides/notesSlide25.xml><?xml version="1.0" encoding="utf-8"?>
-<p:notes xmlns:a="http://schemas.openxmlformats.org/drawingml/2006/main" xmlns:r="http://schemas.openxmlformats.org/officeDocument/2006/relationships" xmlns:p="http://schemas.openxmlformats.org/presentationml/2006/main">
-  <p:cSld>
-    <p:spTree>
-      <p:nvGrpSpPr>
-        <p:cNvPr id="1" name="">
-          <a:extLst>
-            <a:ext uri="{FF2B5EF4-FFF2-40B4-BE49-F238E27FC236}">
               <a16:creationId xmlns:a16="http://schemas.microsoft.com/office/drawing/2014/main" id="{D09F7F6C-BE4F-6CD5-7498-45600C9FA6D4}"/>
             </a:ext>
           </a:extLst>
@@ -1947,7 +1862,7 @@
 </p:notes>
 </file>
 
-<file path=ppt/notesSlides/notesSlide26.xml><?xml version="1.0" encoding="utf-8"?>
+<file path=ppt/notesSlides/notesSlide25.xml><?xml version="1.0" encoding="utf-8"?>
 <p:notes xmlns:a="http://schemas.openxmlformats.org/drawingml/2006/main" xmlns:r="http://schemas.openxmlformats.org/officeDocument/2006/relationships" xmlns:p="http://schemas.openxmlformats.org/presentationml/2006/main">
   <p:cSld>
     <p:spTree>
@@ -2031,7 +1946,7 @@
 </p:notes>
 </file>
 
-<file path=ppt/notesSlides/notesSlide27.xml><?xml version="1.0" encoding="utf-8"?>
+<file path=ppt/notesSlides/notesSlide26.xml><?xml version="1.0" encoding="utf-8"?>
 <p:notes xmlns:a="http://schemas.openxmlformats.org/drawingml/2006/main" xmlns:r="http://schemas.openxmlformats.org/officeDocument/2006/relationships" xmlns:p="http://schemas.openxmlformats.org/presentationml/2006/main">
   <p:cSld>
     <p:spTree>
@@ -2115,7 +2030,7 @@
 </p:notes>
 </file>
 
-<file path=ppt/notesSlides/notesSlide28.xml><?xml version="1.0" encoding="utf-8"?>
+<file path=ppt/notesSlides/notesSlide27.xml><?xml version="1.0" encoding="utf-8"?>
 <p:notes xmlns:a="http://schemas.openxmlformats.org/drawingml/2006/main" xmlns:r="http://schemas.openxmlformats.org/officeDocument/2006/relationships" xmlns:p="http://schemas.openxmlformats.org/presentationml/2006/main">
   <p:cSld>
     <p:spTree>
@@ -2199,7 +2114,7 @@
 </p:notes>
 </file>
 
-<file path=ppt/notesSlides/notesSlide29.xml><?xml version="1.0" encoding="utf-8"?>
+<file path=ppt/notesSlides/notesSlide28.xml><?xml version="1.0" encoding="utf-8"?>
 <p:notes xmlns:a="http://schemas.openxmlformats.org/drawingml/2006/main" xmlns:r="http://schemas.openxmlformats.org/officeDocument/2006/relationships" xmlns:p="http://schemas.openxmlformats.org/presentationml/2006/main">
   <p:cSld>
     <p:spTree>
@@ -2274,6 +2189,90 @@
     <p:extLst>
       <p:ext uri="{BB962C8B-B14F-4D97-AF65-F5344CB8AC3E}">
         <p14:creationId xmlns:p14="http://schemas.microsoft.com/office/powerpoint/2010/main" val="2765148359"/>
+      </p:ext>
+    </p:extLst>
+  </p:cSld>
+  <p:clrMapOvr>
+    <a:masterClrMapping/>
+  </p:clrMapOvr>
+</p:notes>
+</file>
+
+<file path=ppt/notesSlides/notesSlide29.xml><?xml version="1.0" encoding="utf-8"?>
+<p:notes xmlns:a="http://schemas.openxmlformats.org/drawingml/2006/main" xmlns:r="http://schemas.openxmlformats.org/officeDocument/2006/relationships" xmlns:p="http://schemas.openxmlformats.org/presentationml/2006/main">
+  <p:cSld>
+    <p:spTree>
+      <p:nvGrpSpPr>
+        <p:cNvPr id="1" name="">
+          <a:extLst>
+            <a:ext uri="{FF2B5EF4-FFF2-40B4-BE49-F238E27FC236}">
+              <a16:creationId xmlns:a16="http://schemas.microsoft.com/office/drawing/2014/main" id="{1A10A823-DA27-5D53-722C-AF9BE9495C98}"/>
+            </a:ext>
+          </a:extLst>
+        </p:cNvPr>
+        <p:cNvGrpSpPr/>
+        <p:nvPr/>
+      </p:nvGrpSpPr>
+      <p:grpSpPr>
+        <a:xfrm>
+          <a:off x="0" y="0"/>
+          <a:ext cx="0" cy="0"/>
+          <a:chOff x="0" y="0"/>
+          <a:chExt cx="0" cy="0"/>
+        </a:xfrm>
+      </p:grpSpPr>
+      <p:sp>
+        <p:nvSpPr>
+          <p:cNvPr id="2" name="Espaço Reservado para Imagem de Slide 1">
+            <a:extLst>
+              <a:ext uri="{FF2B5EF4-FFF2-40B4-BE49-F238E27FC236}">
+                <a16:creationId xmlns:a16="http://schemas.microsoft.com/office/drawing/2014/main" id="{C38F280B-A2B4-6DD8-5C10-DDC1A4470255}"/>
+              </a:ext>
+            </a:extLst>
+          </p:cNvPr>
+          <p:cNvSpPr>
+            <a:spLocks noGrp="1" noRot="1" noChangeAspect="1"/>
+          </p:cNvSpPr>
+          <p:nvPr>
+            <p:ph type="sldImg"/>
+          </p:nvPr>
+        </p:nvSpPr>
+        <p:spPr>
+          <a:xfrm>
+            <a:off x="381000" y="685800"/>
+            <a:ext cx="6096000" cy="3429000"/>
+          </a:xfrm>
+        </p:spPr>
+      </p:sp>
+      <p:sp>
+        <p:nvSpPr>
+          <p:cNvPr id="3" name="Espaço Reservado para Anotações 2">
+            <a:extLst>
+              <a:ext uri="{FF2B5EF4-FFF2-40B4-BE49-F238E27FC236}">
+                <a16:creationId xmlns:a16="http://schemas.microsoft.com/office/drawing/2014/main" id="{64A603DA-9E38-FFAF-ECE6-005EEE4825E2}"/>
+              </a:ext>
+            </a:extLst>
+          </p:cNvPr>
+          <p:cNvSpPr>
+            <a:spLocks noGrp="1"/>
+          </p:cNvSpPr>
+          <p:nvPr>
+            <p:ph type="body" idx="1"/>
+          </p:nvPr>
+        </p:nvSpPr>
+        <p:spPr/>
+        <p:txBody>
+          <a:bodyPr/>
+          <a:lstStyle/>
+          <a:p>
+            <a:endParaRPr lang="pt-BR" dirty="0"/>
+          </a:p>
+        </p:txBody>
+      </p:sp>
+    </p:spTree>
+    <p:extLst>
+      <p:ext uri="{BB962C8B-B14F-4D97-AF65-F5344CB8AC3E}">
+        <p14:creationId xmlns:p14="http://schemas.microsoft.com/office/powerpoint/2010/main" val="3335067996"/>
       </p:ext>
     </p:extLst>
   </p:cSld>
@@ -2375,90 +2374,6 @@
         <p:cNvPr id="1" name="">
           <a:extLst>
             <a:ext uri="{FF2B5EF4-FFF2-40B4-BE49-F238E27FC236}">
-              <a16:creationId xmlns:a16="http://schemas.microsoft.com/office/drawing/2014/main" id="{1A10A823-DA27-5D53-722C-AF9BE9495C98}"/>
-            </a:ext>
-          </a:extLst>
-        </p:cNvPr>
-        <p:cNvGrpSpPr/>
-        <p:nvPr/>
-      </p:nvGrpSpPr>
-      <p:grpSpPr>
-        <a:xfrm>
-          <a:off x="0" y="0"/>
-          <a:ext cx="0" cy="0"/>
-          <a:chOff x="0" y="0"/>
-          <a:chExt cx="0" cy="0"/>
-        </a:xfrm>
-      </p:grpSpPr>
-      <p:sp>
-        <p:nvSpPr>
-          <p:cNvPr id="2" name="Espaço Reservado para Imagem de Slide 1">
-            <a:extLst>
-              <a:ext uri="{FF2B5EF4-FFF2-40B4-BE49-F238E27FC236}">
-                <a16:creationId xmlns:a16="http://schemas.microsoft.com/office/drawing/2014/main" id="{C38F280B-A2B4-6DD8-5C10-DDC1A4470255}"/>
-              </a:ext>
-            </a:extLst>
-          </p:cNvPr>
-          <p:cNvSpPr>
-            <a:spLocks noGrp="1" noRot="1" noChangeAspect="1"/>
-          </p:cNvSpPr>
-          <p:nvPr>
-            <p:ph type="sldImg"/>
-          </p:nvPr>
-        </p:nvSpPr>
-        <p:spPr>
-          <a:xfrm>
-            <a:off x="381000" y="685800"/>
-            <a:ext cx="6096000" cy="3429000"/>
-          </a:xfrm>
-        </p:spPr>
-      </p:sp>
-      <p:sp>
-        <p:nvSpPr>
-          <p:cNvPr id="3" name="Espaço Reservado para Anotações 2">
-            <a:extLst>
-              <a:ext uri="{FF2B5EF4-FFF2-40B4-BE49-F238E27FC236}">
-                <a16:creationId xmlns:a16="http://schemas.microsoft.com/office/drawing/2014/main" id="{64A603DA-9E38-FFAF-ECE6-005EEE4825E2}"/>
-              </a:ext>
-            </a:extLst>
-          </p:cNvPr>
-          <p:cNvSpPr>
-            <a:spLocks noGrp="1"/>
-          </p:cNvSpPr>
-          <p:nvPr>
-            <p:ph type="body" idx="1"/>
-          </p:nvPr>
-        </p:nvSpPr>
-        <p:spPr/>
-        <p:txBody>
-          <a:bodyPr/>
-          <a:lstStyle/>
-          <a:p>
-            <a:endParaRPr lang="pt-BR" dirty="0"/>
-          </a:p>
-        </p:txBody>
-      </p:sp>
-    </p:spTree>
-    <p:extLst>
-      <p:ext uri="{BB962C8B-B14F-4D97-AF65-F5344CB8AC3E}">
-        <p14:creationId xmlns:p14="http://schemas.microsoft.com/office/powerpoint/2010/main" val="3335067996"/>
-      </p:ext>
-    </p:extLst>
-  </p:cSld>
-  <p:clrMapOvr>
-    <a:masterClrMapping/>
-  </p:clrMapOvr>
-</p:notes>
-</file>
-
-<file path=ppt/notesSlides/notesSlide31.xml><?xml version="1.0" encoding="utf-8"?>
-<p:notes xmlns:a="http://schemas.openxmlformats.org/drawingml/2006/main" xmlns:r="http://schemas.openxmlformats.org/officeDocument/2006/relationships" xmlns:p="http://schemas.openxmlformats.org/presentationml/2006/main">
-  <p:cSld>
-    <p:spTree>
-      <p:nvGrpSpPr>
-        <p:cNvPr id="1" name="">
-          <a:extLst>
-            <a:ext uri="{FF2B5EF4-FFF2-40B4-BE49-F238E27FC236}">
               <a16:creationId xmlns:a16="http://schemas.microsoft.com/office/drawing/2014/main" id="{BA63BEAA-F4FC-7682-1648-70D8B95EA64F}"/>
             </a:ext>
           </a:extLst>
@@ -2535,7 +2450,7 @@
 </p:notes>
 </file>
 
-<file path=ppt/notesSlides/notesSlide32.xml><?xml version="1.0" encoding="utf-8"?>
+<file path=ppt/notesSlides/notesSlide31.xml><?xml version="1.0" encoding="utf-8"?>
 <p:notes xmlns:a="http://schemas.openxmlformats.org/drawingml/2006/main" xmlns:r="http://schemas.openxmlformats.org/officeDocument/2006/relationships" xmlns:p="http://schemas.openxmlformats.org/presentationml/2006/main">
   <p:cSld>
     <p:spTree>
@@ -2619,7 +2534,7 @@
 </p:notes>
 </file>
 
-<file path=ppt/notesSlides/notesSlide33.xml><?xml version="1.0" encoding="utf-8"?>
+<file path=ppt/notesSlides/notesSlide32.xml><?xml version="1.0" encoding="utf-8"?>
 <p:notes xmlns:a="http://schemas.openxmlformats.org/drawingml/2006/main" xmlns:r="http://schemas.openxmlformats.org/officeDocument/2006/relationships" xmlns:p="http://schemas.openxmlformats.org/presentationml/2006/main">
   <p:cSld>
     <p:spTree>
@@ -2703,7 +2618,7 @@
 </p:notes>
 </file>
 
-<file path=ppt/notesSlides/notesSlide34.xml><?xml version="1.0" encoding="utf-8"?>
+<file path=ppt/notesSlides/notesSlide33.xml><?xml version="1.0" encoding="utf-8"?>
 <p:notes xmlns:a="http://schemas.openxmlformats.org/drawingml/2006/main" xmlns:r="http://schemas.openxmlformats.org/officeDocument/2006/relationships" xmlns:p="http://schemas.openxmlformats.org/presentationml/2006/main">
   <p:cSld>
     <p:spTree>
@@ -2769,7 +2684,7 @@
 </p:notes>
 </file>
 
-<file path=ppt/notesSlides/notesSlide35.xml><?xml version="1.0" encoding="utf-8"?>
+<file path=ppt/notesSlides/notesSlide34.xml><?xml version="1.0" encoding="utf-8"?>
 <p:notes xmlns:a="http://schemas.openxmlformats.org/drawingml/2006/main" xmlns:r="http://schemas.openxmlformats.org/officeDocument/2006/relationships" xmlns:p="http://schemas.openxmlformats.org/presentationml/2006/main">
   <p:cSld>
     <p:spTree>
@@ -7929,7 +7844,21 @@
                 <a:latin typeface="Times New Roman" panose="02020603050405020304" pitchFamily="18" charset="0"/>
                 <a:cs typeface="Times New Roman" panose="02020603050405020304" pitchFamily="18" charset="0"/>
               </a:rPr>
-              <a:t>Total de operações: n × n = n</a:t>
+              <a:t>Total de operações: </a:t>
+            </a:r>
+            <a:r>
+              <a:rPr lang="pt-BR" sz="2200" b="1" dirty="0">
+                <a:latin typeface="Times New Roman" panose="02020603050405020304" pitchFamily="18" charset="0"/>
+                <a:cs typeface="Times New Roman" panose="02020603050405020304" pitchFamily="18" charset="0"/>
+              </a:rPr>
+              <a:t>n × n </a:t>
+            </a:r>
+            <a:r>
+              <a:rPr lang="pt-BR" sz="2200" dirty="0">
+                <a:latin typeface="Times New Roman" panose="02020603050405020304" pitchFamily="18" charset="0"/>
+                <a:cs typeface="Times New Roman" panose="02020603050405020304" pitchFamily="18" charset="0"/>
+              </a:rPr>
+              <a:t>= n</a:t>
             </a:r>
             <a:r>
               <a:rPr lang="pt-BR" sz="2200" baseline="30000" dirty="0">
@@ -9098,7 +9027,21 @@
                 <a:latin typeface="Times New Roman" panose="02020603050405020304" pitchFamily="18" charset="0"/>
                 <a:cs typeface="Times New Roman" panose="02020603050405020304" pitchFamily="18" charset="0"/>
               </a:rPr>
-              <a:t> (n).</a:t>
+              <a:t> (</a:t>
+            </a:r>
+            <a:r>
+              <a:rPr lang="pt-BR" sz="2200" b="1" dirty="0">
+                <a:latin typeface="Times New Roman" panose="02020603050405020304" pitchFamily="18" charset="0"/>
+                <a:cs typeface="Times New Roman" panose="02020603050405020304" pitchFamily="18" charset="0"/>
+              </a:rPr>
+              <a:t>n</a:t>
+            </a:r>
+            <a:r>
+              <a:rPr lang="pt-BR" sz="2200" dirty="0">
+                <a:latin typeface="Times New Roman" panose="02020603050405020304" pitchFamily="18" charset="0"/>
+                <a:cs typeface="Times New Roman" panose="02020603050405020304" pitchFamily="18" charset="0"/>
+              </a:rPr>
+              <a:t>).</a:t>
             </a:r>
           </a:p>
           <a:p>
@@ -9130,7 +9073,21 @@
                 <a:latin typeface="Times New Roman" panose="02020603050405020304" pitchFamily="18" charset="0"/>
                 <a:cs typeface="Times New Roman" panose="02020603050405020304" pitchFamily="18" charset="0"/>
               </a:rPr>
-              <a:t>: O(log n) → </a:t>
+              <a:t>: O(</a:t>
+            </a:r>
+            <a:r>
+              <a:rPr lang="pt-BR" sz="2200" b="1" dirty="0">
+                <a:latin typeface="Times New Roman" panose="02020603050405020304" pitchFamily="18" charset="0"/>
+                <a:cs typeface="Times New Roman" panose="02020603050405020304" pitchFamily="18" charset="0"/>
+              </a:rPr>
+              <a:t>log n</a:t>
+            </a:r>
+            <a:r>
+              <a:rPr lang="pt-BR" sz="2200" dirty="0">
+                <a:latin typeface="Times New Roman" panose="02020603050405020304" pitchFamily="18" charset="0"/>
+                <a:cs typeface="Times New Roman" panose="02020603050405020304" pitchFamily="18" charset="0"/>
+              </a:rPr>
+              <a:t>) → </a:t>
             </a:r>
             <a:r>
               <a:rPr lang="pt-BR" sz="2200" b="1" dirty="0">
@@ -9278,21 +9235,21 @@
               <a:buNone/>
             </a:pPr>
             <a:r>
-              <a:rPr lang="pt-BR" sz="2000" dirty="0">
+              <a:rPr lang="pt-BR" sz="2200" dirty="0">
                 <a:latin typeface="Times New Roman" panose="02020603050405020304" pitchFamily="18" charset="0"/>
                 <a:cs typeface="Times New Roman" panose="02020603050405020304" pitchFamily="18" charset="0"/>
               </a:rPr>
               <a:t>A </a:t>
             </a:r>
             <a:r>
-              <a:rPr lang="pt-BR" sz="2000" b="1" dirty="0">
+              <a:rPr lang="pt-BR" sz="2200" b="1" dirty="0">
                 <a:latin typeface="Times New Roman" panose="02020603050405020304" pitchFamily="18" charset="0"/>
                 <a:cs typeface="Times New Roman" panose="02020603050405020304" pitchFamily="18" charset="0"/>
               </a:rPr>
               <a:t>Função </a:t>
             </a:r>
             <a:r>
-              <a:rPr lang="pt-BR" sz="2000" b="1" dirty="0">
+              <a:rPr lang="pt-BR" sz="2200" b="1" dirty="0">
                 <a:solidFill>
                   <a:srgbClr val="FF0000"/>
                 </a:solidFill>
@@ -9302,25 +9259,59 @@
               <a:t>O</a:t>
             </a:r>
             <a:r>
-              <a:rPr lang="pt-BR" sz="2000" b="1" dirty="0">
+              <a:rPr lang="pt-BR" sz="2200" b="1" dirty="0">
                 <a:latin typeface="Times New Roman" panose="02020603050405020304" pitchFamily="18" charset="0"/>
                 <a:cs typeface="Times New Roman" panose="02020603050405020304" pitchFamily="18" charset="0"/>
               </a:rPr>
               <a:t> </a:t>
             </a:r>
             <a:r>
-              <a:rPr lang="pt-BR" sz="2000" dirty="0">
-                <a:latin typeface="Times New Roman" panose="02020603050405020304" pitchFamily="18" charset="0"/>
-                <a:cs typeface="Times New Roman" panose="02020603050405020304" pitchFamily="18" charset="0"/>
-              </a:rPr>
-              <a:t>abstrai constantes e termos de menor ordem.</a:t>
+              <a:rPr lang="pt-BR" sz="2200" dirty="0">
+                <a:latin typeface="Times New Roman" panose="02020603050405020304" pitchFamily="18" charset="0"/>
+                <a:cs typeface="Times New Roman" panose="02020603050405020304" pitchFamily="18" charset="0"/>
+              </a:rPr>
+              <a:t>abstrai </a:t>
+            </a:r>
+            <a:r>
+              <a:rPr lang="pt-BR" sz="2200" b="1" dirty="0">
+                <a:solidFill>
+                  <a:srgbClr val="FF0000"/>
+                </a:solidFill>
+                <a:latin typeface="Times New Roman" panose="02020603050405020304" pitchFamily="18" charset="0"/>
+                <a:cs typeface="Times New Roman" panose="02020603050405020304" pitchFamily="18" charset="0"/>
+              </a:rPr>
+              <a:t>constantes</a:t>
+            </a:r>
+            <a:r>
+              <a:rPr lang="pt-BR" sz="2200" dirty="0">
+                <a:latin typeface="Times New Roman" panose="02020603050405020304" pitchFamily="18" charset="0"/>
+                <a:cs typeface="Times New Roman" panose="02020603050405020304" pitchFamily="18" charset="0"/>
+              </a:rPr>
+              <a:t> e </a:t>
+            </a:r>
+            <a:r>
+              <a:rPr lang="pt-BR" sz="2200" b="1" dirty="0">
+                <a:solidFill>
+                  <a:srgbClr val="FF0000"/>
+                </a:solidFill>
+                <a:latin typeface="Times New Roman" panose="02020603050405020304" pitchFamily="18" charset="0"/>
+                <a:cs typeface="Times New Roman" panose="02020603050405020304" pitchFamily="18" charset="0"/>
+              </a:rPr>
+              <a:t>termos de menor ordem</a:t>
+            </a:r>
+            <a:r>
+              <a:rPr lang="pt-BR" sz="2200" dirty="0">
+                <a:latin typeface="Times New Roman" panose="02020603050405020304" pitchFamily="18" charset="0"/>
+                <a:cs typeface="Times New Roman" panose="02020603050405020304" pitchFamily="18" charset="0"/>
+              </a:rPr>
+              <a:t>.</a:t>
             </a:r>
           </a:p>
           <a:p>
             <a:pPr marL="0" indent="0">
               <a:buNone/>
             </a:pPr>
-            <a:endParaRPr lang="pt-BR" sz="2000" dirty="0">
+            <a:endParaRPr lang="pt-BR" sz="2200" dirty="0">
               <a:latin typeface="Times New Roman" panose="02020603050405020304" pitchFamily="18" charset="0"/>
               <a:cs typeface="Times New Roman" panose="02020603050405020304" pitchFamily="18" charset="0"/>
             </a:endParaRPr>
@@ -9330,7 +9321,7 @@
               <a:buNone/>
             </a:pPr>
             <a:r>
-              <a:rPr lang="pt-BR" sz="2000" dirty="0">
+              <a:rPr lang="pt-BR" sz="2200" dirty="0">
                 <a:latin typeface="Times New Roman" panose="02020603050405020304" pitchFamily="18" charset="0"/>
                 <a:cs typeface="Times New Roman" panose="02020603050405020304" pitchFamily="18" charset="0"/>
               </a:rPr>
@@ -9341,179 +9332,177 @@
             <a:pPr marL="0" indent="0">
               <a:buNone/>
             </a:pPr>
-            <a:endParaRPr lang="pt-BR" sz="2000" dirty="0">
+            <a:r>
+              <a:rPr lang="pt-BR" sz="2200" dirty="0">
+                <a:latin typeface="Times New Roman" panose="02020603050405020304" pitchFamily="18" charset="0"/>
+                <a:cs typeface="Times New Roman" panose="02020603050405020304" pitchFamily="18" charset="0"/>
+              </a:rPr>
+              <a:t>	</a:t>
+            </a:r>
+            <a:r>
+              <a:rPr lang="pt-BR" sz="2200" b="1" dirty="0">
+                <a:latin typeface="Times New Roman" panose="02020603050405020304" pitchFamily="18" charset="0"/>
+                <a:cs typeface="Times New Roman" panose="02020603050405020304" pitchFamily="18" charset="0"/>
+              </a:rPr>
+              <a:t>T(n) </a:t>
+            </a:r>
+            <a:r>
+              <a:rPr lang="pt-BR" sz="2200" dirty="0">
+                <a:latin typeface="Times New Roman" panose="02020603050405020304" pitchFamily="18" charset="0"/>
+                <a:cs typeface="Times New Roman" panose="02020603050405020304" pitchFamily="18" charset="0"/>
+              </a:rPr>
+              <a:t>= 5n</a:t>
+            </a:r>
+            <a:r>
+              <a:rPr lang="pt-BR" sz="2200" baseline="30000" dirty="0">
+                <a:latin typeface="Times New Roman" panose="02020603050405020304" pitchFamily="18" charset="0"/>
+                <a:cs typeface="Times New Roman" panose="02020603050405020304" pitchFamily="18" charset="0"/>
+              </a:rPr>
+              <a:t>2 </a:t>
+            </a:r>
+            <a:r>
+              <a:rPr lang="pt-BR" sz="2200" dirty="0">
+                <a:latin typeface="Times New Roman" panose="02020603050405020304" pitchFamily="18" charset="0"/>
+                <a:cs typeface="Times New Roman" panose="02020603050405020304" pitchFamily="18" charset="0"/>
+              </a:rPr>
+              <a:t>+ 3n + 20</a:t>
+            </a:r>
+          </a:p>
+          <a:p>
+            <a:pPr marL="0" lvl="0" indent="0">
+              <a:buNone/>
+            </a:pPr>
+            <a:endParaRPr lang="pt-BR" sz="2200" dirty="0">
               <a:latin typeface="Times New Roman" panose="02020603050405020304" pitchFamily="18" charset="0"/>
               <a:cs typeface="Times New Roman" panose="02020603050405020304" pitchFamily="18" charset="0"/>
             </a:endParaRPr>
           </a:p>
           <a:p>
-            <a:pPr marL="0" indent="0">
-              <a:buNone/>
-            </a:pPr>
-            <a:r>
-              <a:rPr lang="pt-BR" sz="2000" dirty="0">
-                <a:latin typeface="Times New Roman" panose="02020603050405020304" pitchFamily="18" charset="0"/>
-                <a:cs typeface="Times New Roman" panose="02020603050405020304" pitchFamily="18" charset="0"/>
-              </a:rPr>
-              <a:t>	</a:t>
-            </a:r>
-            <a:r>
-              <a:rPr lang="pt-BR" sz="2000" b="1" dirty="0">
+            <a:pPr marL="0" lvl="0" indent="0">
+              <a:buNone/>
+            </a:pPr>
+            <a:r>
+              <a:rPr lang="pt-BR" sz="2200" b="1" dirty="0">
+                <a:solidFill>
+                  <a:srgbClr val="FF0000"/>
+                </a:solidFill>
+                <a:latin typeface="Times New Roman" panose="02020603050405020304" pitchFamily="18" charset="0"/>
+                <a:cs typeface="Times New Roman" panose="02020603050405020304" pitchFamily="18" charset="0"/>
+              </a:rPr>
+              <a:t>Termo dominante </a:t>
+            </a:r>
+            <a:r>
+              <a:rPr lang="pt-BR" sz="2200" dirty="0">
+                <a:latin typeface="Times New Roman" panose="02020603050405020304" pitchFamily="18" charset="0"/>
+                <a:cs typeface="Times New Roman" panose="02020603050405020304" pitchFamily="18" charset="0"/>
+              </a:rPr>
+              <a:t>= </a:t>
+            </a:r>
+            <a:r>
+              <a:rPr lang="pt-BR" sz="2200" b="1" dirty="0">
+                <a:latin typeface="Times New Roman" panose="02020603050405020304" pitchFamily="18" charset="0"/>
+                <a:cs typeface="Times New Roman" panose="02020603050405020304" pitchFamily="18" charset="0"/>
+              </a:rPr>
+              <a:t>n</a:t>
+            </a:r>
+            <a:r>
+              <a:rPr lang="pt-BR" sz="2200" b="1" baseline="30000" dirty="0">
+                <a:latin typeface="Times New Roman" panose="02020603050405020304" pitchFamily="18" charset="0"/>
+                <a:cs typeface="Times New Roman" panose="02020603050405020304" pitchFamily="18" charset="0"/>
+              </a:rPr>
+              <a:t>2 </a:t>
+            </a:r>
+            <a:r>
+              <a:rPr lang="pt-BR" sz="2200" dirty="0">
+                <a:latin typeface="Times New Roman" panose="02020603050405020304" pitchFamily="18" charset="0"/>
+                <a:cs typeface="Times New Roman" panose="02020603050405020304" pitchFamily="18" charset="0"/>
+              </a:rPr>
+              <a:t>, logo: </a:t>
+            </a:r>
+            <a:r>
+              <a:rPr lang="pt-BR" sz="2200" b="1" dirty="0">
                 <a:latin typeface="Times New Roman" panose="02020603050405020304" pitchFamily="18" charset="0"/>
                 <a:cs typeface="Times New Roman" panose="02020603050405020304" pitchFamily="18" charset="0"/>
               </a:rPr>
               <a:t>T(n) </a:t>
             </a:r>
             <a:r>
-              <a:rPr lang="pt-BR" sz="2000" dirty="0">
-                <a:latin typeface="Times New Roman" panose="02020603050405020304" pitchFamily="18" charset="0"/>
-                <a:cs typeface="Times New Roman" panose="02020603050405020304" pitchFamily="18" charset="0"/>
-              </a:rPr>
-              <a:t>= 5n</a:t>
-            </a:r>
-            <a:r>
-              <a:rPr lang="pt-BR" sz="2000" baseline="30000" dirty="0">
-                <a:latin typeface="Times New Roman" panose="02020603050405020304" pitchFamily="18" charset="0"/>
-                <a:cs typeface="Times New Roman" panose="02020603050405020304" pitchFamily="18" charset="0"/>
-              </a:rPr>
-              <a:t>2 </a:t>
-            </a:r>
-            <a:r>
-              <a:rPr lang="pt-BR" sz="2000" dirty="0">
-                <a:latin typeface="Times New Roman" panose="02020603050405020304" pitchFamily="18" charset="0"/>
-                <a:cs typeface="Times New Roman" panose="02020603050405020304" pitchFamily="18" charset="0"/>
-              </a:rPr>
-              <a:t>+ 3n + 20</a:t>
+              <a:rPr lang="pt-BR" sz="2200" dirty="0">
+                <a:latin typeface="Times New Roman" panose="02020603050405020304" pitchFamily="18" charset="0"/>
+                <a:cs typeface="Times New Roman" panose="02020603050405020304" pitchFamily="18" charset="0"/>
+              </a:rPr>
+              <a:t>∈ O(</a:t>
+            </a:r>
+            <a:r>
+              <a:rPr lang="pt-BR" sz="2200" b="1" dirty="0">
+                <a:solidFill>
+                  <a:srgbClr val="FF0000"/>
+                </a:solidFill>
+                <a:latin typeface="Times New Roman" panose="02020603050405020304" pitchFamily="18" charset="0"/>
+                <a:cs typeface="Times New Roman" panose="02020603050405020304" pitchFamily="18" charset="0"/>
+              </a:rPr>
+              <a:t>n²</a:t>
+            </a:r>
+            <a:r>
+              <a:rPr lang="pt-BR" sz="2200" dirty="0">
+                <a:latin typeface="Times New Roman" panose="02020603050405020304" pitchFamily="18" charset="0"/>
+                <a:cs typeface="Times New Roman" panose="02020603050405020304" pitchFamily="18" charset="0"/>
+              </a:rPr>
+              <a:t>).</a:t>
             </a:r>
           </a:p>
           <a:p>
             <a:pPr marL="0" lvl="0" indent="0">
               <a:buNone/>
             </a:pPr>
-            <a:endParaRPr lang="pt-BR" sz="2000" dirty="0">
+            <a:endParaRPr lang="pt-BR" sz="2200" dirty="0">
               <a:latin typeface="Times New Roman" panose="02020603050405020304" pitchFamily="18" charset="0"/>
               <a:cs typeface="Times New Roman" panose="02020603050405020304" pitchFamily="18" charset="0"/>
             </a:endParaRPr>
           </a:p>
           <a:p>
-            <a:pPr marL="0" lvl="0" indent="0">
-              <a:buNone/>
-            </a:pPr>
-            <a:r>
-              <a:rPr lang="pt-BR" sz="2000" b="1" dirty="0">
+            <a:pPr marL="0" indent="0" algn="just">
+              <a:buNone/>
+            </a:pPr>
+            <a:r>
+              <a:rPr lang="pt-BR" sz="2200" dirty="0">
+                <a:latin typeface="Times New Roman" panose="02020603050405020304" pitchFamily="18" charset="0"/>
+                <a:cs typeface="Times New Roman" panose="02020603050405020304" pitchFamily="18" charset="0"/>
+              </a:rPr>
+              <a:t>Isso significa que o </a:t>
+            </a:r>
+            <a:r>
+              <a:rPr lang="pt-BR" sz="2200" b="1" dirty="0">
+                <a:latin typeface="Times New Roman" panose="02020603050405020304" pitchFamily="18" charset="0"/>
+                <a:cs typeface="Times New Roman" panose="02020603050405020304" pitchFamily="18" charset="0"/>
+              </a:rPr>
+              <a:t>tempo de execução </a:t>
+            </a:r>
+            <a:r>
+              <a:rPr lang="pt-BR" sz="2200" dirty="0">
+                <a:latin typeface="Times New Roman" panose="02020603050405020304" pitchFamily="18" charset="0"/>
+                <a:cs typeface="Times New Roman" panose="02020603050405020304" pitchFamily="18" charset="0"/>
+              </a:rPr>
+              <a:t>cresce no máximo como uma </a:t>
+            </a:r>
+            <a:r>
+              <a:rPr lang="pt-BR" sz="2200" b="1" dirty="0">
                 <a:solidFill>
                   <a:srgbClr val="FF0000"/>
                 </a:solidFill>
                 <a:latin typeface="Times New Roman" panose="02020603050405020304" pitchFamily="18" charset="0"/>
                 <a:cs typeface="Times New Roman" panose="02020603050405020304" pitchFamily="18" charset="0"/>
               </a:rPr>
-              <a:t>Termo dominante </a:t>
-            </a:r>
-            <a:r>
-              <a:rPr lang="pt-BR" sz="2000" dirty="0">
-                <a:latin typeface="Times New Roman" panose="02020603050405020304" pitchFamily="18" charset="0"/>
-                <a:cs typeface="Times New Roman" panose="02020603050405020304" pitchFamily="18" charset="0"/>
-              </a:rPr>
-              <a:t>= n</a:t>
-            </a:r>
-            <a:r>
-              <a:rPr lang="pt-BR" sz="2000" baseline="30000" dirty="0">
-                <a:latin typeface="Times New Roman" panose="02020603050405020304" pitchFamily="18" charset="0"/>
-                <a:cs typeface="Times New Roman" panose="02020603050405020304" pitchFamily="18" charset="0"/>
-              </a:rPr>
-              <a:t>2 </a:t>
-            </a:r>
-            <a:r>
-              <a:rPr lang="pt-BR" sz="2000" dirty="0">
-                <a:latin typeface="Times New Roman" panose="02020603050405020304" pitchFamily="18" charset="0"/>
-                <a:cs typeface="Times New Roman" panose="02020603050405020304" pitchFamily="18" charset="0"/>
-              </a:rPr>
-              <a:t>, logo: </a:t>
-            </a:r>
-            <a:r>
-              <a:rPr lang="pt-BR" sz="2000" b="1" dirty="0">
-                <a:latin typeface="Times New Roman" panose="02020603050405020304" pitchFamily="18" charset="0"/>
-                <a:cs typeface="Times New Roman" panose="02020603050405020304" pitchFamily="18" charset="0"/>
-              </a:rPr>
-              <a:t>T(n) </a:t>
-            </a:r>
-            <a:r>
-              <a:rPr lang="pt-BR" sz="2000" dirty="0">
-                <a:latin typeface="Times New Roman" panose="02020603050405020304" pitchFamily="18" charset="0"/>
-                <a:cs typeface="Times New Roman" panose="02020603050405020304" pitchFamily="18" charset="0"/>
-              </a:rPr>
-              <a:t>∈ O(</a:t>
-            </a:r>
-            <a:r>
-              <a:rPr lang="pt-BR" sz="2000" b="1" dirty="0">
-                <a:solidFill>
-                  <a:srgbClr val="FF0000"/>
-                </a:solidFill>
-                <a:latin typeface="Times New Roman" panose="02020603050405020304" pitchFamily="18" charset="0"/>
-                <a:cs typeface="Times New Roman" panose="02020603050405020304" pitchFamily="18" charset="0"/>
-              </a:rPr>
-              <a:t>n²</a:t>
-            </a:r>
-            <a:r>
-              <a:rPr lang="pt-BR" sz="2000" dirty="0">
-                <a:latin typeface="Times New Roman" panose="02020603050405020304" pitchFamily="18" charset="0"/>
-                <a:cs typeface="Times New Roman" panose="02020603050405020304" pitchFamily="18" charset="0"/>
-              </a:rPr>
-              <a:t>).</a:t>
-            </a:r>
-          </a:p>
-          <a:p>
-            <a:pPr marL="0" lvl="0" indent="0">
-              <a:buNone/>
-            </a:pPr>
-            <a:endParaRPr lang="pt-BR" sz="2000" dirty="0">
-              <a:latin typeface="Times New Roman" panose="02020603050405020304" pitchFamily="18" charset="0"/>
-              <a:cs typeface="Times New Roman" panose="02020603050405020304" pitchFamily="18" charset="0"/>
-            </a:endParaRPr>
-          </a:p>
-          <a:p>
-            <a:pPr marL="0" indent="0" algn="just">
-              <a:buNone/>
-            </a:pPr>
-            <a:r>
-              <a:rPr lang="pt-BR" sz="2000" dirty="0">
-                <a:latin typeface="Times New Roman" panose="02020603050405020304" pitchFamily="18" charset="0"/>
-                <a:cs typeface="Times New Roman" panose="02020603050405020304" pitchFamily="18" charset="0"/>
-              </a:rPr>
-              <a:t>Isso significa que o </a:t>
-            </a:r>
-            <a:r>
-              <a:rPr lang="pt-BR" sz="2000" b="1" dirty="0">
-                <a:latin typeface="Times New Roman" panose="02020603050405020304" pitchFamily="18" charset="0"/>
-                <a:cs typeface="Times New Roman" panose="02020603050405020304" pitchFamily="18" charset="0"/>
-              </a:rPr>
-              <a:t>tempo de execução </a:t>
-            </a:r>
-            <a:r>
-              <a:rPr lang="pt-BR" sz="2000" dirty="0">
-                <a:latin typeface="Times New Roman" panose="02020603050405020304" pitchFamily="18" charset="0"/>
-                <a:cs typeface="Times New Roman" panose="02020603050405020304" pitchFamily="18" charset="0"/>
-              </a:rPr>
-              <a:t>cresce no máximo como uma </a:t>
-            </a:r>
-            <a:r>
-              <a:rPr lang="pt-BR" sz="2000" b="1" dirty="0">
-                <a:solidFill>
-                  <a:srgbClr val="FF0000"/>
-                </a:solidFill>
-                <a:latin typeface="Times New Roman" panose="02020603050405020304" pitchFamily="18" charset="0"/>
-                <a:cs typeface="Times New Roman" panose="02020603050405020304" pitchFamily="18" charset="0"/>
-              </a:rPr>
               <a:t>função quadrática</a:t>
             </a:r>
             <a:r>
-              <a:rPr lang="pt-BR" sz="2000" dirty="0">
+              <a:rPr lang="pt-BR" sz="2200" dirty="0">
                 <a:latin typeface="Times New Roman" panose="02020603050405020304" pitchFamily="18" charset="0"/>
                 <a:cs typeface="Times New Roman" panose="02020603050405020304" pitchFamily="18" charset="0"/>
               </a:rPr>
               <a:t>.</a:t>
             </a:r>
-            <a:endParaRPr lang="pt-BR" sz="2000" dirty="0">
+            <a:endParaRPr lang="pt-BR" sz="2200" dirty="0">
               <a:solidFill>
                 <a:schemeClr val="tx1"/>
               </a:solidFill>
@@ -11553,7 +11542,21 @@
                 <a:latin typeface="Times New Roman" panose="02020603050405020304" pitchFamily="18" charset="0"/>
                 <a:cs typeface="Times New Roman" panose="02020603050405020304" pitchFamily="18" charset="0"/>
               </a:rPr>
-              <a:t>, linear.</a:t>
+              <a:t>, </a:t>
+            </a:r>
+            <a:r>
+              <a:rPr lang="pt-BR" sz="2200" b="1" dirty="0">
+                <a:latin typeface="Times New Roman" panose="02020603050405020304" pitchFamily="18" charset="0"/>
+                <a:cs typeface="Times New Roman" panose="02020603050405020304" pitchFamily="18" charset="0"/>
+              </a:rPr>
+              <a:t>linear</a:t>
+            </a:r>
+            <a:r>
+              <a:rPr lang="pt-BR" sz="2200" dirty="0">
+                <a:latin typeface="Times New Roman" panose="02020603050405020304" pitchFamily="18" charset="0"/>
+                <a:cs typeface="Times New Roman" panose="02020603050405020304" pitchFamily="18" charset="0"/>
+              </a:rPr>
+              <a:t>.</a:t>
             </a:r>
           </a:p>
         </p:txBody>
@@ -12220,218 +12223,6 @@
         <p:cNvPr id="1" name="">
           <a:extLst>
             <a:ext uri="{FF2B5EF4-FFF2-40B4-BE49-F238E27FC236}">
-              <a16:creationId xmlns:a16="http://schemas.microsoft.com/office/drawing/2014/main" id="{CF089CBF-0309-1527-BCFE-05D04AC82E7E}"/>
-            </a:ext>
-          </a:extLst>
-        </p:cNvPr>
-        <p:cNvGrpSpPr/>
-        <p:nvPr/>
-      </p:nvGrpSpPr>
-      <p:grpSpPr>
-        <a:xfrm>
-          <a:off x="0" y="0"/>
-          <a:ext cx="0" cy="0"/>
-          <a:chOff x="0" y="0"/>
-          <a:chExt cx="0" cy="0"/>
-        </a:xfrm>
-      </p:grpSpPr>
-      <p:sp>
-        <p:nvSpPr>
-          <p:cNvPr id="6" name="Title 1">
-            <a:extLst>
-              <a:ext uri="{FF2B5EF4-FFF2-40B4-BE49-F238E27FC236}">
-                <a16:creationId xmlns:a16="http://schemas.microsoft.com/office/drawing/2014/main" id="{E621C5CD-EE94-CBBB-5CAC-D5E35A29958F}"/>
-              </a:ext>
-            </a:extLst>
-          </p:cNvPr>
-          <p:cNvSpPr>
-            <a:spLocks noGrp="1"/>
-          </p:cNvSpPr>
-          <p:nvPr>
-            <p:ph type="title"/>
-          </p:nvPr>
-        </p:nvSpPr>
-        <p:spPr>
-          <a:xfrm>
-            <a:off x="457200" y="205980"/>
-            <a:ext cx="8229600" cy="857251"/>
-          </a:xfrm>
-        </p:spPr>
-        <p:txBody>
-          <a:bodyPr>
-            <a:normAutofit/>
-          </a:bodyPr>
-          <a:lstStyle/>
-          <a:p>
-            <a:r>
-              <a:rPr lang="en-US" b="1" dirty="0" err="1">
-                <a:solidFill>
-                  <a:srgbClr val="0070C0"/>
-                </a:solidFill>
-              </a:rPr>
-              <a:t>Dinâmica</a:t>
-            </a:r>
-            <a:r>
-              <a:rPr lang="en-US" b="1" dirty="0">
-                <a:solidFill>
-                  <a:srgbClr val="0070C0"/>
-                </a:solidFill>
-              </a:rPr>
-              <a:t>/</a:t>
-            </a:r>
-            <a:r>
-              <a:rPr lang="en-US" b="1" dirty="0" err="1">
-                <a:solidFill>
-                  <a:srgbClr val="0070C0"/>
-                </a:solidFill>
-              </a:rPr>
-              <a:t>Atividades</a:t>
-            </a:r>
-            <a:endParaRPr lang="en-US" b="1" dirty="0">
-              <a:solidFill>
-                <a:srgbClr val="0070C0"/>
-              </a:solidFill>
-            </a:endParaRPr>
-          </a:p>
-        </p:txBody>
-      </p:sp>
-      <p:sp>
-        <p:nvSpPr>
-          <p:cNvPr id="8" name="Text Placeholder 2">
-            <a:extLst>
-              <a:ext uri="{FF2B5EF4-FFF2-40B4-BE49-F238E27FC236}">
-                <a16:creationId xmlns:a16="http://schemas.microsoft.com/office/drawing/2014/main" id="{03E824C2-A3CD-8F82-D017-61683AA7F50C}"/>
-              </a:ext>
-            </a:extLst>
-          </p:cNvPr>
-          <p:cNvSpPr>
-            <a:spLocks noGrp="1"/>
-          </p:cNvSpPr>
-          <p:nvPr>
-            <p:ph type="body" sz="half" idx="1"/>
-          </p:nvPr>
-        </p:nvSpPr>
-        <p:spPr>
-          <a:xfrm>
-            <a:off x="139472" y="1063230"/>
-            <a:ext cx="8865056" cy="3874290"/>
-          </a:xfrm>
-        </p:spPr>
-        <p:txBody>
-          <a:bodyPr>
-            <a:noAutofit/>
-          </a:bodyPr>
-          <a:lstStyle/>
-          <a:p>
-            <a:pPr marL="0" indent="0" algn="just">
-              <a:buNone/>
-            </a:pPr>
-            <a:endParaRPr lang="pt-BR" sz="2200" dirty="0">
-              <a:latin typeface="Times New Roman" panose="02020603050405020304" pitchFamily="18" charset="0"/>
-              <a:cs typeface="Times New Roman" panose="02020603050405020304" pitchFamily="18" charset="0"/>
-            </a:endParaRPr>
-          </a:p>
-          <a:p>
-            <a:pPr marL="0" indent="0" algn="just">
-              <a:buNone/>
-            </a:pPr>
-            <a:endParaRPr lang="pt-BR" sz="2200" dirty="0">
-              <a:latin typeface="Times New Roman" panose="02020603050405020304" pitchFamily="18" charset="0"/>
-              <a:cs typeface="Times New Roman" panose="02020603050405020304" pitchFamily="18" charset="0"/>
-            </a:endParaRPr>
-          </a:p>
-          <a:p>
-            <a:pPr marL="0" indent="0" algn="just">
-              <a:buNone/>
-            </a:pPr>
-            <a:endParaRPr lang="pt-BR" sz="2200" dirty="0">
-              <a:latin typeface="Times New Roman" panose="02020603050405020304" pitchFamily="18" charset="0"/>
-              <a:cs typeface="Times New Roman" panose="02020603050405020304" pitchFamily="18" charset="0"/>
-            </a:endParaRPr>
-          </a:p>
-          <a:p>
-            <a:pPr marL="0" indent="0" algn="just">
-              <a:buNone/>
-            </a:pPr>
-            <a:endParaRPr lang="pt-BR" sz="2200" dirty="0">
-              <a:latin typeface="Times New Roman" panose="02020603050405020304" pitchFamily="18" charset="0"/>
-              <a:cs typeface="Times New Roman" panose="02020603050405020304" pitchFamily="18" charset="0"/>
-            </a:endParaRPr>
-          </a:p>
-          <a:p>
-            <a:pPr marL="0" indent="0" algn="just">
-              <a:buNone/>
-            </a:pPr>
-            <a:r>
-              <a:rPr lang="pt-BR" sz="2200" b="1" dirty="0">
-                <a:latin typeface="Times New Roman" panose="02020603050405020304" pitchFamily="18" charset="0"/>
-                <a:cs typeface="Times New Roman" panose="02020603050405020304" pitchFamily="18" charset="0"/>
-              </a:rPr>
-              <a:t>Explique</a:t>
-            </a:r>
-            <a:r>
-              <a:rPr lang="pt-BR" sz="2200" dirty="0">
-                <a:latin typeface="Times New Roman" panose="02020603050405020304" pitchFamily="18" charset="0"/>
-                <a:cs typeface="Times New Roman" panose="02020603050405020304" pitchFamily="18" charset="0"/>
-              </a:rPr>
-              <a:t> por que a </a:t>
-            </a:r>
-            <a:r>
-              <a:rPr lang="pt-BR" sz="2200" b="1" dirty="0">
-                <a:latin typeface="Times New Roman" panose="02020603050405020304" pitchFamily="18" charset="0"/>
-                <a:cs typeface="Times New Roman" panose="02020603050405020304" pitchFamily="18" charset="0"/>
-              </a:rPr>
-              <a:t>busca binária </a:t>
-            </a:r>
-            <a:r>
-              <a:rPr lang="pt-BR" sz="2200" dirty="0">
-                <a:latin typeface="Times New Roman" panose="02020603050405020304" pitchFamily="18" charset="0"/>
-                <a:cs typeface="Times New Roman" panose="02020603050405020304" pitchFamily="18" charset="0"/>
-              </a:rPr>
-              <a:t>é mais eficiente que a </a:t>
-            </a:r>
-            <a:r>
-              <a:rPr lang="pt-BR" sz="2200" b="1" dirty="0">
-                <a:solidFill>
-                  <a:srgbClr val="FF0000"/>
-                </a:solidFill>
-                <a:latin typeface="Times New Roman" panose="02020603050405020304" pitchFamily="18" charset="0"/>
-                <a:cs typeface="Times New Roman" panose="02020603050405020304" pitchFamily="18" charset="0"/>
-              </a:rPr>
-              <a:t>busca linear</a:t>
-            </a:r>
-            <a:r>
-              <a:rPr lang="pt-BR" sz="2200" dirty="0">
-                <a:latin typeface="Times New Roman" panose="02020603050405020304" pitchFamily="18" charset="0"/>
-                <a:cs typeface="Times New Roman" panose="02020603050405020304" pitchFamily="18" charset="0"/>
-              </a:rPr>
-              <a:t>?</a:t>
-            </a:r>
-          </a:p>
-        </p:txBody>
-      </p:sp>
-    </p:spTree>
-    <p:extLst>
-      <p:ext uri="{BB962C8B-B14F-4D97-AF65-F5344CB8AC3E}">
-        <p14:creationId xmlns:p14="http://schemas.microsoft.com/office/powerpoint/2010/main" val="1644318395"/>
-      </p:ext>
-    </p:extLst>
-  </p:cSld>
-  <p:clrMapOvr>
-    <a:masterClrMapping/>
-  </p:clrMapOvr>
-  <p:transition spd="med"/>
-</p:sld>
-</file>
-
-<file path=ppt/slides/slide26.xml><?xml version="1.0" encoding="utf-8"?>
-<p:sld xmlns:a="http://schemas.openxmlformats.org/drawingml/2006/main" xmlns:r="http://schemas.openxmlformats.org/officeDocument/2006/relationships" xmlns:p="http://schemas.openxmlformats.org/presentationml/2006/main">
-  <p:cSld>
-    <p:spTree>
-      <p:nvGrpSpPr>
-        <p:cNvPr id="1" name="">
-          <a:extLst>
-            <a:ext uri="{FF2B5EF4-FFF2-40B4-BE49-F238E27FC236}">
               <a16:creationId xmlns:a16="http://schemas.microsoft.com/office/drawing/2014/main" id="{F7C174E5-3661-FEB4-73EB-3872A8940C80}"/>
             </a:ext>
           </a:extLst>
@@ -12614,7 +12405,7 @@
 </p:sld>
 </file>
 
-<file path=ppt/slides/slide27.xml><?xml version="1.0" encoding="utf-8"?>
+<file path=ppt/slides/slide26.xml><?xml version="1.0" encoding="utf-8"?>
 <p:sld xmlns:a="http://schemas.openxmlformats.org/drawingml/2006/main" xmlns:r="http://schemas.openxmlformats.org/officeDocument/2006/relationships" xmlns:p="http://schemas.openxmlformats.org/presentationml/2006/main">
   <p:cSld>
     <p:spTree>
@@ -12718,8 +12509,8 @@
         </p:nvSpPr>
         <p:spPr>
           <a:xfrm>
-            <a:off x="139472" y="1063230"/>
-            <a:ext cx="8865056" cy="3874290"/>
+            <a:off x="139472" y="1063229"/>
+            <a:ext cx="8865056" cy="3979417"/>
           </a:xfrm>
         </p:spPr>
         <p:txBody>
@@ -12747,23 +12538,86 @@
             </a:r>
           </a:p>
           <a:p>
+            <a:pPr lvl="0" algn="just"/>
+            <a:r>
+              <a:rPr lang="pt-BR" sz="2200" dirty="0">
+                <a:latin typeface="Times New Roman" panose="02020603050405020304" pitchFamily="18" charset="0"/>
+                <a:cs typeface="Times New Roman" panose="02020603050405020304" pitchFamily="18" charset="0"/>
+              </a:rPr>
+              <a:t>Busca Linear O(</a:t>
+            </a:r>
+            <a:r>
+              <a:rPr lang="pt-BR" sz="2200" b="1" dirty="0">
+                <a:solidFill>
+                  <a:srgbClr val="FF0000"/>
+                </a:solidFill>
+                <a:latin typeface="Times New Roman" panose="02020603050405020304" pitchFamily="18" charset="0"/>
+                <a:cs typeface="Times New Roman" panose="02020603050405020304" pitchFamily="18" charset="0"/>
+              </a:rPr>
+              <a:t>n</a:t>
+            </a:r>
+            <a:r>
+              <a:rPr lang="pt-BR" sz="2200" dirty="0">
+                <a:latin typeface="Times New Roman" panose="02020603050405020304" pitchFamily="18" charset="0"/>
+                <a:cs typeface="Times New Roman" panose="02020603050405020304" pitchFamily="18" charset="0"/>
+              </a:rPr>
+              <a:t>): precisa verificar cada elemento da lista, no pior caso percorre todos os n elementos.</a:t>
+            </a:r>
+          </a:p>
+          <a:p>
+            <a:pPr lvl="0" algn="just"/>
+            <a:r>
+              <a:rPr lang="pt-BR" sz="2200" dirty="0">
+                <a:latin typeface="Times New Roman" panose="02020603050405020304" pitchFamily="18" charset="0"/>
+                <a:cs typeface="Times New Roman" panose="02020603050405020304" pitchFamily="18" charset="0"/>
+              </a:rPr>
+              <a:t>Busca Binária O</a:t>
+            </a:r>
+            <a:r>
+              <a:rPr lang="pt-BR" sz="2200" b="1" dirty="0">
+                <a:solidFill>
+                  <a:srgbClr val="FF0000"/>
+                </a:solidFill>
+                <a:latin typeface="Times New Roman" panose="02020603050405020304" pitchFamily="18" charset="0"/>
+                <a:cs typeface="Times New Roman" panose="02020603050405020304" pitchFamily="18" charset="0"/>
+              </a:rPr>
+              <a:t>(log n</a:t>
+            </a:r>
+            <a:r>
+              <a:rPr lang="pt-BR" sz="2200" dirty="0">
+                <a:latin typeface="Times New Roman" panose="02020603050405020304" pitchFamily="18" charset="0"/>
+                <a:cs typeface="Times New Roman" panose="02020603050405020304" pitchFamily="18" charset="0"/>
+              </a:rPr>
+              <a:t>): a cada passo divide o espaço de busca pela metade, reduzindo drasticamente o número de comparações.</a:t>
+            </a:r>
+          </a:p>
+          <a:p>
+            <a:pPr marL="0" indent="0">
+              <a:buNone/>
+            </a:pPr>
+            <a:r>
+              <a:rPr lang="pt-BR" sz="2200" b="1" dirty="0">
+                <a:latin typeface="Times New Roman" panose="02020603050405020304" pitchFamily="18" charset="0"/>
+                <a:cs typeface="Times New Roman" panose="02020603050405020304" pitchFamily="18" charset="0"/>
+              </a:rPr>
+              <a:t>Exemplo prático</a:t>
+            </a:r>
+            <a:r>
+              <a:rPr lang="pt-BR" sz="2200" dirty="0">
+                <a:latin typeface="Times New Roman" panose="02020603050405020304" pitchFamily="18" charset="0"/>
+                <a:cs typeface="Times New Roman" panose="02020603050405020304" pitchFamily="18" charset="0"/>
+              </a:rPr>
+              <a:t>:</a:t>
+            </a:r>
+          </a:p>
+          <a:p>
             <a:pPr lvl="0"/>
             <a:r>
               <a:rPr lang="pt-BR" sz="2200" dirty="0">
                 <a:latin typeface="Times New Roman" panose="02020603050405020304" pitchFamily="18" charset="0"/>
                 <a:cs typeface="Times New Roman" panose="02020603050405020304" pitchFamily="18" charset="0"/>
               </a:rPr>
-              <a:t>Busca Linear (O(n)): precisa verificar cada elemento da lista, no pior caso percorre todos os n elementos.</a:t>
-            </a:r>
-          </a:p>
-          <a:p>
-            <a:pPr lvl="0"/>
-            <a:r>
-              <a:rPr lang="pt-BR" sz="2200" dirty="0">
-                <a:latin typeface="Times New Roman" panose="02020603050405020304" pitchFamily="18" charset="0"/>
-                <a:cs typeface="Times New Roman" panose="02020603050405020304" pitchFamily="18" charset="0"/>
-              </a:rPr>
-              <a:t>Busca Binária (O</a:t>
+              <a:t>Lista com </a:t>
             </a:r>
             <a:r>
               <a:rPr lang="pt-BR" sz="2200" b="1" dirty="0">
@@ -12773,63 +12627,99 @@
                 <a:latin typeface="Times New Roman" panose="02020603050405020304" pitchFamily="18" charset="0"/>
                 <a:cs typeface="Times New Roman" panose="02020603050405020304" pitchFamily="18" charset="0"/>
               </a:rPr>
-              <a:t>(log n</a:t>
-            </a:r>
-            <a:r>
-              <a:rPr lang="pt-BR" sz="2200" dirty="0">
-                <a:latin typeface="Times New Roman" panose="02020603050405020304" pitchFamily="18" charset="0"/>
-                <a:cs typeface="Times New Roman" panose="02020603050405020304" pitchFamily="18" charset="0"/>
-              </a:rPr>
-              <a:t>)): a cada passo divide o espaço de busca pela metade, reduzindo drasticamente o número de comparações.</a:t>
-            </a:r>
-          </a:p>
-          <a:p>
-            <a:pPr marL="0" indent="0">
-              <a:buNone/>
-            </a:pPr>
+              <a:t>1.000.000 de elementos</a:t>
+            </a:r>
+            <a:r>
+              <a:rPr lang="pt-BR" sz="2200" dirty="0">
+                <a:latin typeface="Times New Roman" panose="02020603050405020304" pitchFamily="18" charset="0"/>
+                <a:cs typeface="Times New Roman" panose="02020603050405020304" pitchFamily="18" charset="0"/>
+              </a:rPr>
+              <a:t>:</a:t>
+            </a:r>
+          </a:p>
+          <a:p>
+            <a:pPr lvl="1"/>
             <a:r>
               <a:rPr lang="pt-BR" sz="2200" b="1" dirty="0">
                 <a:latin typeface="Times New Roman" panose="02020603050405020304" pitchFamily="18" charset="0"/>
                 <a:cs typeface="Times New Roman" panose="02020603050405020304" pitchFamily="18" charset="0"/>
               </a:rPr>
-              <a:t>Exemplo prático</a:t>
-            </a:r>
-            <a:r>
-              <a:rPr lang="pt-BR" sz="2200" dirty="0">
-                <a:latin typeface="Times New Roman" panose="02020603050405020304" pitchFamily="18" charset="0"/>
-                <a:cs typeface="Times New Roman" panose="02020603050405020304" pitchFamily="18" charset="0"/>
-              </a:rPr>
-              <a:t>:</a:t>
-            </a:r>
-          </a:p>
-          <a:p>
-            <a:pPr lvl="0"/>
-            <a:r>
-              <a:rPr lang="pt-BR" sz="2200" dirty="0">
-                <a:latin typeface="Times New Roman" panose="02020603050405020304" pitchFamily="18" charset="0"/>
-                <a:cs typeface="Times New Roman" panose="02020603050405020304" pitchFamily="18" charset="0"/>
-              </a:rPr>
-              <a:t>Lista com 1.000.000 de elementos:</a:t>
+              <a:t>Busca linear </a:t>
+            </a:r>
+            <a:r>
+              <a:rPr lang="pt-BR" sz="2200" dirty="0">
+                <a:latin typeface="Times New Roman" panose="02020603050405020304" pitchFamily="18" charset="0"/>
+                <a:cs typeface="Times New Roman" panose="02020603050405020304" pitchFamily="18" charset="0"/>
+              </a:rPr>
+              <a:t>→ até </a:t>
+            </a:r>
+            <a:r>
+              <a:rPr lang="pt-BR" sz="2200" b="1" dirty="0">
+                <a:solidFill>
+                  <a:srgbClr val="FF0000"/>
+                </a:solidFill>
+                <a:latin typeface="Times New Roman" panose="02020603050405020304" pitchFamily="18" charset="0"/>
+                <a:cs typeface="Times New Roman" panose="02020603050405020304" pitchFamily="18" charset="0"/>
+              </a:rPr>
+              <a:t>1.000.000 comparações</a:t>
+            </a:r>
+            <a:r>
+              <a:rPr lang="pt-BR" sz="2200" dirty="0">
+                <a:latin typeface="Times New Roman" panose="02020603050405020304" pitchFamily="18" charset="0"/>
+                <a:cs typeface="Times New Roman" panose="02020603050405020304" pitchFamily="18" charset="0"/>
+              </a:rPr>
+              <a:t>.</a:t>
             </a:r>
           </a:p>
           <a:p>
             <a:pPr lvl="1"/>
             <a:r>
-              <a:rPr lang="pt-BR" sz="2200" dirty="0">
-                <a:latin typeface="Times New Roman" panose="02020603050405020304" pitchFamily="18" charset="0"/>
-                <a:cs typeface="Times New Roman" panose="02020603050405020304" pitchFamily="18" charset="0"/>
-              </a:rPr>
-              <a:t>Busca linear → até 1.000.000 comparações.</a:t>
-            </a:r>
-          </a:p>
-          <a:p>
-            <a:pPr lvl="1"/>
-            <a:r>
-              <a:rPr lang="pt-BR" sz="2200" dirty="0">
-                <a:latin typeface="Times New Roman" panose="02020603050405020304" pitchFamily="18" charset="0"/>
-                <a:cs typeface="Times New Roman" panose="02020603050405020304" pitchFamily="18" charset="0"/>
-              </a:rPr>
-              <a:t>Busca binária → no máximo ~20 comparações, </a:t>
+              <a:rPr lang="pt-BR" sz="2200" b="1" dirty="0">
+                <a:latin typeface="Times New Roman" panose="02020603050405020304" pitchFamily="18" charset="0"/>
+                <a:cs typeface="Times New Roman" panose="02020603050405020304" pitchFamily="18" charset="0"/>
+              </a:rPr>
+              <a:t>Busca binária </a:t>
+            </a:r>
+            <a:r>
+              <a:rPr lang="pt-BR" sz="2200" dirty="0">
+                <a:latin typeface="Times New Roman" panose="02020603050405020304" pitchFamily="18" charset="0"/>
+                <a:cs typeface="Times New Roman" panose="02020603050405020304" pitchFamily="18" charset="0"/>
+              </a:rPr>
+              <a:t>→ no </a:t>
+            </a:r>
+            <a:r>
+              <a:rPr lang="pt-BR" sz="2200" b="1" dirty="0">
+                <a:solidFill>
+                  <a:srgbClr val="FF0000"/>
+                </a:solidFill>
+                <a:latin typeface="Times New Roman" panose="02020603050405020304" pitchFamily="18" charset="0"/>
+                <a:cs typeface="Times New Roman" panose="02020603050405020304" pitchFamily="18" charset="0"/>
+              </a:rPr>
+              <a:t>máximo </a:t>
+            </a:r>
+            <a:r>
+              <a:rPr lang="pt-BR" sz="2200" dirty="0">
+                <a:latin typeface="Times New Roman" panose="02020603050405020304" pitchFamily="18" charset="0"/>
+                <a:cs typeface="Times New Roman" panose="02020603050405020304" pitchFamily="18" charset="0"/>
+              </a:rPr>
+              <a:t>≈ </a:t>
+            </a:r>
+            <a:r>
+              <a:rPr lang="pt-BR" sz="2200" b="1" dirty="0">
+                <a:solidFill>
+                  <a:srgbClr val="FF0000"/>
+                </a:solidFill>
+                <a:latin typeface="Times New Roman" panose="02020603050405020304" pitchFamily="18" charset="0"/>
+                <a:cs typeface="Times New Roman" panose="02020603050405020304" pitchFamily="18" charset="0"/>
+              </a:rPr>
+              <a:t>20 comparações</a:t>
+            </a:r>
+            <a:r>
+              <a:rPr lang="pt-BR" sz="2200" dirty="0">
+                <a:latin typeface="Times New Roman" panose="02020603050405020304" pitchFamily="18" charset="0"/>
+                <a:cs typeface="Times New Roman" panose="02020603050405020304" pitchFamily="18" charset="0"/>
+              </a:rPr>
+              <a:t>, </a:t>
             </a:r>
           </a:p>
           <a:p>
@@ -12898,7 +12788,7 @@
 </p:sld>
 </file>
 
-<file path=ppt/slides/slide28.xml><?xml version="1.0" encoding="utf-8"?>
+<file path=ppt/slides/slide27.xml><?xml version="1.0" encoding="utf-8"?>
 <p:sld xmlns:a="http://schemas.openxmlformats.org/drawingml/2006/main" xmlns:r="http://schemas.openxmlformats.org/officeDocument/2006/relationships" xmlns:p="http://schemas.openxmlformats.org/presentationml/2006/main">
   <p:cSld>
     <p:spTree>
@@ -13024,91 +12914,91 @@
             <a:pPr marL="0" indent="0" algn="just">
               <a:buNone/>
             </a:pPr>
+            <a:r>
+              <a:rPr lang="pt-BR" sz="2200" dirty="0">
+                <a:latin typeface="Times New Roman" panose="02020603050405020304" pitchFamily="18" charset="0"/>
+                <a:cs typeface="Times New Roman" panose="02020603050405020304" pitchFamily="18" charset="0"/>
+              </a:rPr>
+              <a:t>	A </a:t>
+            </a:r>
+            <a:r>
+              <a:rPr lang="pt-BR" sz="2200" b="1" dirty="0">
+                <a:latin typeface="Times New Roman" panose="02020603050405020304" pitchFamily="18" charset="0"/>
+                <a:cs typeface="Times New Roman" panose="02020603050405020304" pitchFamily="18" charset="0"/>
+              </a:rPr>
+              <a:t>busca binária </a:t>
+            </a:r>
+            <a:r>
+              <a:rPr lang="pt-BR" sz="2200" dirty="0">
+                <a:latin typeface="Times New Roman" panose="02020603050405020304" pitchFamily="18" charset="0"/>
+                <a:cs typeface="Times New Roman" panose="02020603050405020304" pitchFamily="18" charset="0"/>
+              </a:rPr>
+              <a:t>é mais </a:t>
+            </a:r>
+            <a:r>
+              <a:rPr lang="pt-BR" sz="2200" b="1" dirty="0">
+                <a:solidFill>
+                  <a:srgbClr val="FF0000"/>
+                </a:solidFill>
+                <a:latin typeface="Times New Roman" panose="02020603050405020304" pitchFamily="18" charset="0"/>
+                <a:cs typeface="Times New Roman" panose="02020603050405020304" pitchFamily="18" charset="0"/>
+              </a:rPr>
+              <a:t>eficiente</a:t>
+            </a:r>
+            <a:r>
+              <a:rPr lang="pt-BR" sz="2200" dirty="0">
+                <a:latin typeface="Times New Roman" panose="02020603050405020304" pitchFamily="18" charset="0"/>
+                <a:cs typeface="Times New Roman" panose="02020603050405020304" pitchFamily="18" charset="0"/>
+              </a:rPr>
+              <a:t> porque </a:t>
+            </a:r>
+            <a:r>
+              <a:rPr lang="pt-BR" sz="2200" b="1" dirty="0">
+                <a:latin typeface="Times New Roman" panose="02020603050405020304" pitchFamily="18" charset="0"/>
+                <a:cs typeface="Times New Roman" panose="02020603050405020304" pitchFamily="18" charset="0"/>
+              </a:rPr>
+              <a:t>cresce de forma logarítmica</a:t>
+            </a:r>
+            <a:r>
+              <a:rPr lang="pt-BR" sz="2200" dirty="0">
+                <a:latin typeface="Times New Roman" panose="02020603050405020304" pitchFamily="18" charset="0"/>
+                <a:cs typeface="Times New Roman" panose="02020603050405020304" pitchFamily="18" charset="0"/>
+              </a:rPr>
+              <a:t>, enquanto a </a:t>
+            </a:r>
+            <a:r>
+              <a:rPr lang="pt-BR" sz="2200" b="1" dirty="0">
+                <a:latin typeface="Times New Roman" panose="02020603050405020304" pitchFamily="18" charset="0"/>
+                <a:cs typeface="Times New Roman" panose="02020603050405020304" pitchFamily="18" charset="0"/>
+              </a:rPr>
+              <a:t>busca linear </a:t>
+            </a:r>
+            <a:r>
+              <a:rPr lang="pt-BR" sz="2200" b="1" dirty="0">
+                <a:solidFill>
+                  <a:srgbClr val="FF0000"/>
+                </a:solidFill>
+                <a:latin typeface="Times New Roman" panose="02020603050405020304" pitchFamily="18" charset="0"/>
+                <a:cs typeface="Times New Roman" panose="02020603050405020304" pitchFamily="18" charset="0"/>
+              </a:rPr>
+              <a:t>cresce de forma linear</a:t>
+            </a:r>
+            <a:r>
+              <a:rPr lang="pt-BR" sz="2200" dirty="0">
+                <a:latin typeface="Times New Roman" panose="02020603050405020304" pitchFamily="18" charset="0"/>
+                <a:cs typeface="Times New Roman" panose="02020603050405020304" pitchFamily="18" charset="0"/>
+              </a:rPr>
+              <a:t>. </a:t>
+            </a:r>
+          </a:p>
+          <a:p>
+            <a:pPr marL="0" indent="0" algn="just">
+              <a:buNone/>
+            </a:pPr>
             <a:endParaRPr lang="pt-BR" sz="2200" dirty="0">
               <a:latin typeface="Times New Roman" panose="02020603050405020304" pitchFamily="18" charset="0"/>
               <a:cs typeface="Times New Roman" panose="02020603050405020304" pitchFamily="18" charset="0"/>
             </a:endParaRPr>
-          </a:p>
-          <a:p>
-            <a:pPr marL="0" indent="0" algn="just">
-              <a:buNone/>
-            </a:pPr>
-            <a:r>
-              <a:rPr lang="pt-BR" sz="2200" dirty="0">
-                <a:latin typeface="Times New Roman" panose="02020603050405020304" pitchFamily="18" charset="0"/>
-                <a:cs typeface="Times New Roman" panose="02020603050405020304" pitchFamily="18" charset="0"/>
-              </a:rPr>
-              <a:t>	A </a:t>
-            </a:r>
-            <a:r>
-              <a:rPr lang="pt-BR" sz="2200" b="1" dirty="0">
-                <a:latin typeface="Times New Roman" panose="02020603050405020304" pitchFamily="18" charset="0"/>
-                <a:cs typeface="Times New Roman" panose="02020603050405020304" pitchFamily="18" charset="0"/>
-              </a:rPr>
-              <a:t>busca binária </a:t>
-            </a:r>
-            <a:r>
-              <a:rPr lang="pt-BR" sz="2200" dirty="0">
-                <a:latin typeface="Times New Roman" panose="02020603050405020304" pitchFamily="18" charset="0"/>
-                <a:cs typeface="Times New Roman" panose="02020603050405020304" pitchFamily="18" charset="0"/>
-              </a:rPr>
-              <a:t>é mais </a:t>
-            </a:r>
-            <a:r>
-              <a:rPr lang="pt-BR" sz="2200" b="1" dirty="0">
-                <a:solidFill>
-                  <a:srgbClr val="FF0000"/>
-                </a:solidFill>
-                <a:latin typeface="Times New Roman" panose="02020603050405020304" pitchFamily="18" charset="0"/>
-                <a:cs typeface="Times New Roman" panose="02020603050405020304" pitchFamily="18" charset="0"/>
-              </a:rPr>
-              <a:t>eficiente</a:t>
-            </a:r>
-            <a:r>
-              <a:rPr lang="pt-BR" sz="2200" dirty="0">
-                <a:latin typeface="Times New Roman" panose="02020603050405020304" pitchFamily="18" charset="0"/>
-                <a:cs typeface="Times New Roman" panose="02020603050405020304" pitchFamily="18" charset="0"/>
-              </a:rPr>
-              <a:t> porque </a:t>
-            </a:r>
-            <a:r>
-              <a:rPr lang="pt-BR" sz="2200" b="1" dirty="0">
-                <a:latin typeface="Times New Roman" panose="02020603050405020304" pitchFamily="18" charset="0"/>
-                <a:cs typeface="Times New Roman" panose="02020603050405020304" pitchFamily="18" charset="0"/>
-              </a:rPr>
-              <a:t>cresce de forma logarítmica</a:t>
-            </a:r>
-            <a:r>
-              <a:rPr lang="pt-BR" sz="2200" dirty="0">
-                <a:latin typeface="Times New Roman" panose="02020603050405020304" pitchFamily="18" charset="0"/>
-                <a:cs typeface="Times New Roman" panose="02020603050405020304" pitchFamily="18" charset="0"/>
-              </a:rPr>
-              <a:t>, enquanto a </a:t>
-            </a:r>
-            <a:r>
-              <a:rPr lang="pt-BR" sz="2200" b="1" dirty="0">
-                <a:latin typeface="Times New Roman" panose="02020603050405020304" pitchFamily="18" charset="0"/>
-                <a:cs typeface="Times New Roman" panose="02020603050405020304" pitchFamily="18" charset="0"/>
-              </a:rPr>
-              <a:t>busca linear </a:t>
-            </a:r>
-            <a:r>
-              <a:rPr lang="pt-BR" sz="2200" b="1" dirty="0">
-                <a:solidFill>
-                  <a:srgbClr val="FF0000"/>
-                </a:solidFill>
-                <a:latin typeface="Times New Roman" panose="02020603050405020304" pitchFamily="18" charset="0"/>
-                <a:cs typeface="Times New Roman" panose="02020603050405020304" pitchFamily="18" charset="0"/>
-              </a:rPr>
-              <a:t>cresce de forma linear</a:t>
-            </a:r>
-            <a:r>
-              <a:rPr lang="pt-BR" sz="2200" dirty="0">
-                <a:latin typeface="Times New Roman" panose="02020603050405020304" pitchFamily="18" charset="0"/>
-                <a:cs typeface="Times New Roman" panose="02020603050405020304" pitchFamily="18" charset="0"/>
-              </a:rPr>
-              <a:t>. </a:t>
-            </a:r>
           </a:p>
           <a:p>
             <a:pPr marL="0" indent="0" algn="just">
@@ -13178,7 +13068,7 @@
 </p:sld>
 </file>
 
-<file path=ppt/slides/slide29.xml><?xml version="1.0" encoding="utf-8"?>
+<file path=ppt/slides/slide28.xml><?xml version="1.0" encoding="utf-8"?>
 <p:sld xmlns:a="http://schemas.openxmlformats.org/drawingml/2006/main" xmlns:r="http://schemas.openxmlformats.org/officeDocument/2006/relationships" xmlns:p="http://schemas.openxmlformats.org/presentationml/2006/main">
   <p:cSld>
     <p:spTree>
@@ -13461,360 +13351,7 @@
 </p:sld>
 </file>
 
-<file path=ppt/slides/slide3.xml><?xml version="1.0" encoding="utf-8"?>
-<p:sld xmlns:a="http://schemas.openxmlformats.org/drawingml/2006/main" xmlns:r="http://schemas.openxmlformats.org/officeDocument/2006/relationships" xmlns:p="http://schemas.openxmlformats.org/presentationml/2006/main">
-  <p:cSld>
-    <p:spTree>
-      <p:nvGrpSpPr>
-        <p:cNvPr id="1" name=""/>
-        <p:cNvGrpSpPr/>
-        <p:nvPr/>
-      </p:nvGrpSpPr>
-      <p:grpSpPr>
-        <a:xfrm>
-          <a:off x="0" y="0"/>
-          <a:ext cx="0" cy="0"/>
-          <a:chOff x="0" y="0"/>
-          <a:chExt cx="0" cy="0"/>
-        </a:xfrm>
-      </p:grpSpPr>
-      <p:sp>
-        <p:nvSpPr>
-          <p:cNvPr id="6" name="Title 1"/>
-          <p:cNvSpPr>
-            <a:spLocks noGrp="1"/>
-          </p:cNvSpPr>
-          <p:nvPr>
-            <p:ph type="title"/>
-          </p:nvPr>
-        </p:nvSpPr>
-        <p:spPr>
-          <a:xfrm>
-            <a:off x="457200" y="205980"/>
-            <a:ext cx="8229600" cy="857251"/>
-          </a:xfrm>
-        </p:spPr>
-        <p:txBody>
-          <a:bodyPr>
-            <a:normAutofit/>
-          </a:bodyPr>
-          <a:lstStyle/>
-          <a:p>
-            <a:r>
-              <a:rPr lang="en-US" b="1" dirty="0">
-                <a:solidFill>
-                  <a:srgbClr val="0070C0"/>
-                </a:solidFill>
-              </a:rPr>
-              <a:t>O Que é Analise de </a:t>
-            </a:r>
-            <a:r>
-              <a:rPr lang="en-US" b="1" dirty="0" err="1">
-                <a:solidFill>
-                  <a:srgbClr val="0070C0"/>
-                </a:solidFill>
-              </a:rPr>
-              <a:t>Algoritmos</a:t>
-            </a:r>
-            <a:endParaRPr lang="en-US" b="1" dirty="0">
-              <a:solidFill>
-                <a:srgbClr val="0070C0"/>
-              </a:solidFill>
-            </a:endParaRPr>
-          </a:p>
-        </p:txBody>
-      </p:sp>
-      <p:sp>
-        <p:nvSpPr>
-          <p:cNvPr id="8" name="Text Placeholder 2"/>
-          <p:cNvSpPr>
-            <a:spLocks noGrp="1"/>
-          </p:cNvSpPr>
-          <p:nvPr>
-            <p:ph type="body" sz="half" idx="1"/>
-          </p:nvPr>
-        </p:nvSpPr>
-        <p:spPr>
-          <a:xfrm>
-            <a:off x="142865" y="1200150"/>
-            <a:ext cx="8865056" cy="3737370"/>
-          </a:xfrm>
-        </p:spPr>
-        <p:txBody>
-          <a:bodyPr>
-            <a:noAutofit/>
-          </a:bodyPr>
-          <a:lstStyle/>
-          <a:p>
-            <a:pPr marL="0" indent="0" algn="just">
-              <a:buNone/>
-            </a:pPr>
-            <a:r>
-              <a:rPr lang="pt-BR" sz="2200" dirty="0">
-                <a:latin typeface="Times New Roman" panose="02020603050405020304" pitchFamily="18" charset="0"/>
-                <a:cs typeface="Times New Roman" panose="02020603050405020304" pitchFamily="18" charset="0"/>
-              </a:rPr>
-              <a:t>Analisar algoritmos significa </a:t>
-            </a:r>
-            <a:r>
-              <a:rPr lang="pt-BR" sz="2200" b="1" dirty="0">
-                <a:solidFill>
-                  <a:srgbClr val="FF0000"/>
-                </a:solidFill>
-                <a:latin typeface="Times New Roman" panose="02020603050405020304" pitchFamily="18" charset="0"/>
-                <a:cs typeface="Times New Roman" panose="02020603050405020304" pitchFamily="18" charset="0"/>
-              </a:rPr>
-              <a:t>medir a eficiência </a:t>
-            </a:r>
-            <a:r>
-              <a:rPr lang="pt-BR" sz="2200" dirty="0">
-                <a:latin typeface="Times New Roman" panose="02020603050405020304" pitchFamily="18" charset="0"/>
-                <a:cs typeface="Times New Roman" panose="02020603050405020304" pitchFamily="18" charset="0"/>
-              </a:rPr>
-              <a:t>de um algoritmo em termos de </a:t>
-            </a:r>
-            <a:r>
-              <a:rPr lang="pt-BR" sz="2200" b="1" dirty="0">
-                <a:latin typeface="Times New Roman" panose="02020603050405020304" pitchFamily="18" charset="0"/>
-                <a:cs typeface="Times New Roman" panose="02020603050405020304" pitchFamily="18" charset="0"/>
-              </a:rPr>
-              <a:t>tempo de execução </a:t>
-            </a:r>
-            <a:r>
-              <a:rPr lang="pt-BR" sz="2200" b="1" dirty="0">
-                <a:solidFill>
-                  <a:srgbClr val="FF0000"/>
-                </a:solidFill>
-                <a:latin typeface="Times New Roman" panose="02020603050405020304" pitchFamily="18" charset="0"/>
-                <a:cs typeface="Times New Roman" panose="02020603050405020304" pitchFamily="18" charset="0"/>
-              </a:rPr>
-              <a:t>e/ou </a:t>
-            </a:r>
-            <a:r>
-              <a:rPr lang="pt-BR" sz="2200" b="1" dirty="0">
-                <a:latin typeface="Times New Roman" panose="02020603050405020304" pitchFamily="18" charset="0"/>
-                <a:cs typeface="Times New Roman" panose="02020603050405020304" pitchFamily="18" charset="0"/>
-              </a:rPr>
-              <a:t>uso de memória</a:t>
-            </a:r>
-            <a:r>
-              <a:rPr lang="pt-BR" sz="2200" dirty="0">
-                <a:latin typeface="Times New Roman" panose="02020603050405020304" pitchFamily="18" charset="0"/>
-                <a:cs typeface="Times New Roman" panose="02020603050405020304" pitchFamily="18" charset="0"/>
-              </a:rPr>
-              <a:t>.</a:t>
-            </a:r>
-          </a:p>
-          <a:p>
-            <a:pPr marL="0" indent="0" algn="just">
-              <a:buNone/>
-            </a:pPr>
-            <a:endParaRPr lang="pt-BR" sz="2200" dirty="0">
-              <a:latin typeface="Times New Roman" panose="02020603050405020304" pitchFamily="18" charset="0"/>
-              <a:cs typeface="Times New Roman" panose="02020603050405020304" pitchFamily="18" charset="0"/>
-            </a:endParaRPr>
-          </a:p>
-          <a:p>
-            <a:pPr marL="0" indent="0" algn="just">
-              <a:buNone/>
-            </a:pPr>
-            <a:r>
-              <a:rPr lang="pt-BR" sz="2200" b="1" dirty="0">
-                <a:latin typeface="Times New Roman" panose="02020603050405020304" pitchFamily="18" charset="0"/>
-                <a:cs typeface="Times New Roman" panose="02020603050405020304" pitchFamily="18" charset="0"/>
-              </a:rPr>
-              <a:t>A análise geralmente considera</a:t>
-            </a:r>
-            <a:r>
-              <a:rPr lang="pt-BR" sz="2200" dirty="0">
-                <a:latin typeface="Times New Roman" panose="02020603050405020304" pitchFamily="18" charset="0"/>
-                <a:cs typeface="Times New Roman" panose="02020603050405020304" pitchFamily="18" charset="0"/>
-              </a:rPr>
-              <a:t>:</a:t>
-            </a:r>
-          </a:p>
-          <a:p>
-            <a:pPr marL="0" indent="0" algn="just">
-              <a:buNone/>
-            </a:pPr>
-            <a:endParaRPr lang="pt-BR" sz="2200" dirty="0">
-              <a:latin typeface="Times New Roman" panose="02020603050405020304" pitchFamily="18" charset="0"/>
-              <a:cs typeface="Times New Roman" panose="02020603050405020304" pitchFamily="18" charset="0"/>
-            </a:endParaRPr>
-          </a:p>
-          <a:p>
-            <a:pPr algn="just"/>
-            <a:r>
-              <a:rPr lang="pt-BR" sz="2200" b="1" dirty="0">
-                <a:latin typeface="Times New Roman" panose="02020603050405020304" pitchFamily="18" charset="0"/>
-                <a:cs typeface="Times New Roman" panose="02020603050405020304" pitchFamily="18" charset="0"/>
-              </a:rPr>
-              <a:t>Pior caso </a:t>
-            </a:r>
-            <a:r>
-              <a:rPr lang="pt-BR" sz="2200" dirty="0">
-                <a:latin typeface="Times New Roman" panose="02020603050405020304" pitchFamily="18" charset="0"/>
-                <a:cs typeface="Times New Roman" panose="02020603050405020304" pitchFamily="18" charset="0"/>
-              </a:rPr>
-              <a:t>(</a:t>
-            </a:r>
-            <a:r>
-              <a:rPr lang="pt-BR" sz="2200" b="1" dirty="0" err="1">
-                <a:solidFill>
-                  <a:srgbClr val="FF0000"/>
-                </a:solidFill>
-                <a:latin typeface="Times New Roman" panose="02020603050405020304" pitchFamily="18" charset="0"/>
-                <a:cs typeface="Times New Roman" panose="02020603050405020304" pitchFamily="18" charset="0"/>
-              </a:rPr>
-              <a:t>worst</a:t>
-            </a:r>
-            <a:r>
-              <a:rPr lang="pt-BR" sz="2200" b="1" dirty="0">
-                <a:solidFill>
-                  <a:srgbClr val="FF0000"/>
-                </a:solidFill>
-                <a:latin typeface="Times New Roman" panose="02020603050405020304" pitchFamily="18" charset="0"/>
-                <a:cs typeface="Times New Roman" panose="02020603050405020304" pitchFamily="18" charset="0"/>
-              </a:rPr>
-              <a:t> case</a:t>
-            </a:r>
-            <a:r>
-              <a:rPr lang="pt-BR" sz="2200" dirty="0">
-                <a:latin typeface="Times New Roman" panose="02020603050405020304" pitchFamily="18" charset="0"/>
-                <a:cs typeface="Times New Roman" panose="02020603050405020304" pitchFamily="18" charset="0"/>
-              </a:rPr>
-              <a:t>) – Cenário mais custoso.</a:t>
-            </a:r>
-          </a:p>
-          <a:p>
-            <a:pPr algn="just"/>
-            <a:r>
-              <a:rPr lang="pt-BR" sz="2200" b="1" dirty="0">
-                <a:latin typeface="Times New Roman" panose="02020603050405020304" pitchFamily="18" charset="0"/>
-                <a:cs typeface="Times New Roman" panose="02020603050405020304" pitchFamily="18" charset="0"/>
-              </a:rPr>
-              <a:t>Melhor caso </a:t>
-            </a:r>
-            <a:r>
-              <a:rPr lang="pt-BR" sz="2200" dirty="0">
-                <a:latin typeface="Times New Roman" panose="02020603050405020304" pitchFamily="18" charset="0"/>
-                <a:cs typeface="Times New Roman" panose="02020603050405020304" pitchFamily="18" charset="0"/>
-              </a:rPr>
-              <a:t>(</a:t>
-            </a:r>
-            <a:r>
-              <a:rPr lang="pt-BR" sz="2200" b="1" dirty="0" err="1">
-                <a:solidFill>
-                  <a:srgbClr val="FF0000"/>
-                </a:solidFill>
-                <a:latin typeface="Times New Roman" panose="02020603050405020304" pitchFamily="18" charset="0"/>
-                <a:cs typeface="Times New Roman" panose="02020603050405020304" pitchFamily="18" charset="0"/>
-              </a:rPr>
-              <a:t>best</a:t>
-            </a:r>
-            <a:r>
-              <a:rPr lang="pt-BR" sz="2200" b="1" dirty="0">
-                <a:solidFill>
-                  <a:srgbClr val="FF0000"/>
-                </a:solidFill>
-                <a:latin typeface="Times New Roman" panose="02020603050405020304" pitchFamily="18" charset="0"/>
-                <a:cs typeface="Times New Roman" panose="02020603050405020304" pitchFamily="18" charset="0"/>
-              </a:rPr>
-              <a:t> case</a:t>
-            </a:r>
-            <a:r>
-              <a:rPr lang="pt-BR" sz="2200" dirty="0">
-                <a:latin typeface="Times New Roman" panose="02020603050405020304" pitchFamily="18" charset="0"/>
-                <a:cs typeface="Times New Roman" panose="02020603050405020304" pitchFamily="18" charset="0"/>
-              </a:rPr>
-              <a:t>) – Cenário mais rápido.</a:t>
-            </a:r>
-          </a:p>
-          <a:p>
-            <a:pPr algn="just"/>
-            <a:r>
-              <a:rPr lang="pt-BR" sz="2200" b="1" dirty="0">
-                <a:latin typeface="Times New Roman" panose="02020603050405020304" pitchFamily="18" charset="0"/>
-                <a:cs typeface="Times New Roman" panose="02020603050405020304" pitchFamily="18" charset="0"/>
-              </a:rPr>
-              <a:t>Caso médio </a:t>
-            </a:r>
-            <a:r>
-              <a:rPr lang="pt-BR" sz="2200" dirty="0">
-                <a:latin typeface="Times New Roman" panose="02020603050405020304" pitchFamily="18" charset="0"/>
-                <a:cs typeface="Times New Roman" panose="02020603050405020304" pitchFamily="18" charset="0"/>
-              </a:rPr>
-              <a:t>(</a:t>
-            </a:r>
-            <a:r>
-              <a:rPr lang="pt-BR" sz="2200" b="1" dirty="0" err="1">
-                <a:solidFill>
-                  <a:srgbClr val="FF0000"/>
-                </a:solidFill>
-                <a:latin typeface="Times New Roman" panose="02020603050405020304" pitchFamily="18" charset="0"/>
-                <a:cs typeface="Times New Roman" panose="02020603050405020304" pitchFamily="18" charset="0"/>
-              </a:rPr>
-              <a:t>average</a:t>
-            </a:r>
-            <a:r>
-              <a:rPr lang="pt-BR" sz="2200" b="1" dirty="0">
-                <a:solidFill>
-                  <a:srgbClr val="FF0000"/>
-                </a:solidFill>
-                <a:latin typeface="Times New Roman" panose="02020603050405020304" pitchFamily="18" charset="0"/>
-                <a:cs typeface="Times New Roman" panose="02020603050405020304" pitchFamily="18" charset="0"/>
-              </a:rPr>
-              <a:t> case</a:t>
-            </a:r>
-            <a:r>
-              <a:rPr lang="pt-BR" sz="2200" dirty="0">
-                <a:latin typeface="Times New Roman" panose="02020603050405020304" pitchFamily="18" charset="0"/>
-                <a:cs typeface="Times New Roman" panose="02020603050405020304" pitchFamily="18" charset="0"/>
-              </a:rPr>
-              <a:t>) – </a:t>
-            </a:r>
-            <a:r>
-              <a:rPr lang="pt-BR" sz="2200" b="1" dirty="0">
-                <a:solidFill>
-                  <a:srgbClr val="FF0000"/>
-                </a:solidFill>
-                <a:latin typeface="Times New Roman" panose="02020603050405020304" pitchFamily="18" charset="0"/>
-                <a:cs typeface="Times New Roman" panose="02020603050405020304" pitchFamily="18" charset="0"/>
-              </a:rPr>
-              <a:t>Situação mais provável</a:t>
-            </a:r>
-            <a:r>
-              <a:rPr lang="pt-BR" sz="2200" dirty="0">
-                <a:latin typeface="Times New Roman" panose="02020603050405020304" pitchFamily="18" charset="0"/>
-                <a:cs typeface="Times New Roman" panose="02020603050405020304" pitchFamily="18" charset="0"/>
-              </a:rPr>
-              <a:t>.</a:t>
-            </a:r>
-            <a:endParaRPr lang="pt-BR" sz="2200" dirty="0">
-              <a:solidFill>
-                <a:schemeClr val="tx1"/>
-              </a:solidFill>
-              <a:latin typeface="Times New Roman" panose="02020603050405020304" pitchFamily="18" charset="0"/>
-              <a:cs typeface="Times New Roman" panose="02020603050405020304" pitchFamily="18" charset="0"/>
-            </a:endParaRPr>
-          </a:p>
-        </p:txBody>
-      </p:sp>
-    </p:spTree>
-    <p:extLst>
-      <p:ext uri="{BB962C8B-B14F-4D97-AF65-F5344CB8AC3E}">
-        <p14:creationId xmlns:p14="http://schemas.microsoft.com/office/powerpoint/2010/main" val="1362980025"/>
-      </p:ext>
-    </p:extLst>
-  </p:cSld>
-  <p:clrMapOvr>
-    <a:masterClrMapping/>
-  </p:clrMapOvr>
-  <p:transition spd="med"/>
-</p:sld>
-</file>
-
-<file path=ppt/slides/slide30.xml><?xml version="1.0" encoding="utf-8"?>
+<file path=ppt/slides/slide29.xml><?xml version="1.0" encoding="utf-8"?>
 <p:sld xmlns:a="http://schemas.openxmlformats.org/drawingml/2006/main" xmlns:r="http://schemas.openxmlformats.org/officeDocument/2006/relationships" xmlns:p="http://schemas.openxmlformats.org/presentationml/2006/main">
   <p:cSld>
     <p:spTree>
@@ -14216,7 +13753,376 @@
 </p:sld>
 </file>
 
-<file path=ppt/slides/slide31.xml><?xml version="1.0" encoding="utf-8"?>
+<file path=ppt/slides/slide3.xml><?xml version="1.0" encoding="utf-8"?>
+<p:sld xmlns:a="http://schemas.openxmlformats.org/drawingml/2006/main" xmlns:r="http://schemas.openxmlformats.org/officeDocument/2006/relationships" xmlns:p="http://schemas.openxmlformats.org/presentationml/2006/main">
+  <p:cSld>
+    <p:spTree>
+      <p:nvGrpSpPr>
+        <p:cNvPr id="1" name=""/>
+        <p:cNvGrpSpPr/>
+        <p:nvPr/>
+      </p:nvGrpSpPr>
+      <p:grpSpPr>
+        <a:xfrm>
+          <a:off x="0" y="0"/>
+          <a:ext cx="0" cy="0"/>
+          <a:chOff x="0" y="0"/>
+          <a:chExt cx="0" cy="0"/>
+        </a:xfrm>
+      </p:grpSpPr>
+      <p:sp>
+        <p:nvSpPr>
+          <p:cNvPr id="6" name="Title 1"/>
+          <p:cNvSpPr>
+            <a:spLocks noGrp="1"/>
+          </p:cNvSpPr>
+          <p:nvPr>
+            <p:ph type="title"/>
+          </p:nvPr>
+        </p:nvSpPr>
+        <p:spPr>
+          <a:xfrm>
+            <a:off x="457200" y="205980"/>
+            <a:ext cx="8229600" cy="857251"/>
+          </a:xfrm>
+        </p:spPr>
+        <p:txBody>
+          <a:bodyPr>
+            <a:normAutofit/>
+          </a:bodyPr>
+          <a:lstStyle/>
+          <a:p>
+            <a:r>
+              <a:rPr lang="en-US" b="1" dirty="0">
+                <a:solidFill>
+                  <a:srgbClr val="0070C0"/>
+                </a:solidFill>
+              </a:rPr>
+              <a:t>O Que é </a:t>
+            </a:r>
+            <a:r>
+              <a:rPr lang="en-US" b="1" dirty="0" err="1">
+                <a:solidFill>
+                  <a:srgbClr val="0070C0"/>
+                </a:solidFill>
+              </a:rPr>
+              <a:t>Análise</a:t>
+            </a:r>
+            <a:r>
+              <a:rPr lang="en-US" b="1" dirty="0">
+                <a:solidFill>
+                  <a:srgbClr val="0070C0"/>
+                </a:solidFill>
+              </a:rPr>
+              <a:t> de </a:t>
+            </a:r>
+            <a:r>
+              <a:rPr lang="en-US" b="1" dirty="0" err="1">
+                <a:solidFill>
+                  <a:srgbClr val="0070C0"/>
+                </a:solidFill>
+              </a:rPr>
+              <a:t>Algoritmos</a:t>
+            </a:r>
+            <a:endParaRPr lang="en-US" b="1" dirty="0">
+              <a:solidFill>
+                <a:srgbClr val="0070C0"/>
+              </a:solidFill>
+            </a:endParaRPr>
+          </a:p>
+        </p:txBody>
+      </p:sp>
+      <p:sp>
+        <p:nvSpPr>
+          <p:cNvPr id="8" name="Text Placeholder 2"/>
+          <p:cNvSpPr>
+            <a:spLocks noGrp="1"/>
+          </p:cNvSpPr>
+          <p:nvPr>
+            <p:ph type="body" sz="half" idx="1"/>
+          </p:nvPr>
+        </p:nvSpPr>
+        <p:spPr>
+          <a:xfrm>
+            <a:off x="142865" y="1200150"/>
+            <a:ext cx="8865056" cy="3737370"/>
+          </a:xfrm>
+        </p:spPr>
+        <p:txBody>
+          <a:bodyPr>
+            <a:noAutofit/>
+          </a:bodyPr>
+          <a:lstStyle/>
+          <a:p>
+            <a:pPr marL="0" indent="0" algn="just">
+              <a:buNone/>
+            </a:pPr>
+            <a:r>
+              <a:rPr lang="pt-BR" sz="2200" dirty="0">
+                <a:latin typeface="Times New Roman" panose="02020603050405020304" pitchFamily="18" charset="0"/>
+                <a:cs typeface="Times New Roman" panose="02020603050405020304" pitchFamily="18" charset="0"/>
+              </a:rPr>
+              <a:t>Analisar algoritmos significa </a:t>
+            </a:r>
+            <a:r>
+              <a:rPr lang="pt-BR" sz="2200" b="1" dirty="0">
+                <a:solidFill>
+                  <a:srgbClr val="FF0000"/>
+                </a:solidFill>
+                <a:latin typeface="Times New Roman" panose="02020603050405020304" pitchFamily="18" charset="0"/>
+                <a:cs typeface="Times New Roman" panose="02020603050405020304" pitchFamily="18" charset="0"/>
+              </a:rPr>
+              <a:t>medir a eficiência </a:t>
+            </a:r>
+            <a:r>
+              <a:rPr lang="pt-BR" sz="2200" dirty="0">
+                <a:latin typeface="Times New Roman" panose="02020603050405020304" pitchFamily="18" charset="0"/>
+                <a:cs typeface="Times New Roman" panose="02020603050405020304" pitchFamily="18" charset="0"/>
+              </a:rPr>
+              <a:t>de um algoritmo em termos de </a:t>
+            </a:r>
+            <a:r>
+              <a:rPr lang="pt-BR" sz="2200" b="1" dirty="0">
+                <a:latin typeface="Times New Roman" panose="02020603050405020304" pitchFamily="18" charset="0"/>
+                <a:cs typeface="Times New Roman" panose="02020603050405020304" pitchFamily="18" charset="0"/>
+              </a:rPr>
+              <a:t>tempo de execução </a:t>
+            </a:r>
+            <a:r>
+              <a:rPr lang="pt-BR" sz="2200" b="1" dirty="0">
+                <a:solidFill>
+                  <a:srgbClr val="FF0000"/>
+                </a:solidFill>
+                <a:latin typeface="Times New Roman" panose="02020603050405020304" pitchFamily="18" charset="0"/>
+                <a:cs typeface="Times New Roman" panose="02020603050405020304" pitchFamily="18" charset="0"/>
+              </a:rPr>
+              <a:t>e/ou </a:t>
+            </a:r>
+            <a:r>
+              <a:rPr lang="pt-BR" sz="2200" b="1" dirty="0">
+                <a:latin typeface="Times New Roman" panose="02020603050405020304" pitchFamily="18" charset="0"/>
+                <a:cs typeface="Times New Roman" panose="02020603050405020304" pitchFamily="18" charset="0"/>
+              </a:rPr>
+              <a:t>uso de memória</a:t>
+            </a:r>
+            <a:r>
+              <a:rPr lang="pt-BR" sz="2200" dirty="0">
+                <a:latin typeface="Times New Roman" panose="02020603050405020304" pitchFamily="18" charset="0"/>
+                <a:cs typeface="Times New Roman" panose="02020603050405020304" pitchFamily="18" charset="0"/>
+              </a:rPr>
+              <a:t>.</a:t>
+            </a:r>
+          </a:p>
+          <a:p>
+            <a:pPr marL="0" indent="0" algn="just">
+              <a:buNone/>
+            </a:pPr>
+            <a:endParaRPr lang="pt-BR" sz="2200" dirty="0">
+              <a:latin typeface="Times New Roman" panose="02020603050405020304" pitchFamily="18" charset="0"/>
+              <a:cs typeface="Times New Roman" panose="02020603050405020304" pitchFamily="18" charset="0"/>
+            </a:endParaRPr>
+          </a:p>
+          <a:p>
+            <a:pPr marL="0" indent="0" algn="just">
+              <a:buNone/>
+            </a:pPr>
+            <a:r>
+              <a:rPr lang="pt-BR" sz="2200" b="1" dirty="0">
+                <a:latin typeface="Times New Roman" panose="02020603050405020304" pitchFamily="18" charset="0"/>
+                <a:cs typeface="Times New Roman" panose="02020603050405020304" pitchFamily="18" charset="0"/>
+              </a:rPr>
+              <a:t>A análise geralmente considera</a:t>
+            </a:r>
+            <a:r>
+              <a:rPr lang="pt-BR" sz="2200" dirty="0">
+                <a:latin typeface="Times New Roman" panose="02020603050405020304" pitchFamily="18" charset="0"/>
+                <a:cs typeface="Times New Roman" panose="02020603050405020304" pitchFamily="18" charset="0"/>
+              </a:rPr>
+              <a:t>:</a:t>
+            </a:r>
+          </a:p>
+          <a:p>
+            <a:pPr marL="0" indent="0" algn="just">
+              <a:buNone/>
+            </a:pPr>
+            <a:endParaRPr lang="pt-BR" sz="2200" dirty="0">
+              <a:latin typeface="Times New Roman" panose="02020603050405020304" pitchFamily="18" charset="0"/>
+              <a:cs typeface="Times New Roman" panose="02020603050405020304" pitchFamily="18" charset="0"/>
+            </a:endParaRPr>
+          </a:p>
+          <a:p>
+            <a:pPr algn="just"/>
+            <a:r>
+              <a:rPr lang="pt-BR" sz="2200" b="1" dirty="0">
+                <a:latin typeface="Times New Roman" panose="02020603050405020304" pitchFamily="18" charset="0"/>
+                <a:cs typeface="Times New Roman" panose="02020603050405020304" pitchFamily="18" charset="0"/>
+              </a:rPr>
+              <a:t>Pior caso </a:t>
+            </a:r>
+            <a:r>
+              <a:rPr lang="pt-BR" sz="2200" dirty="0">
+                <a:latin typeface="Times New Roman" panose="02020603050405020304" pitchFamily="18" charset="0"/>
+                <a:cs typeface="Times New Roman" panose="02020603050405020304" pitchFamily="18" charset="0"/>
+              </a:rPr>
+              <a:t>(</a:t>
+            </a:r>
+            <a:r>
+              <a:rPr lang="pt-BR" sz="2200" b="1" dirty="0" err="1">
+                <a:solidFill>
+                  <a:srgbClr val="FF0000"/>
+                </a:solidFill>
+                <a:latin typeface="Times New Roman" panose="02020603050405020304" pitchFamily="18" charset="0"/>
+                <a:cs typeface="Times New Roman" panose="02020603050405020304" pitchFamily="18" charset="0"/>
+              </a:rPr>
+              <a:t>worst</a:t>
+            </a:r>
+            <a:r>
+              <a:rPr lang="pt-BR" sz="2200" b="1" dirty="0">
+                <a:solidFill>
+                  <a:srgbClr val="FF0000"/>
+                </a:solidFill>
+                <a:latin typeface="Times New Roman" panose="02020603050405020304" pitchFamily="18" charset="0"/>
+                <a:cs typeface="Times New Roman" panose="02020603050405020304" pitchFamily="18" charset="0"/>
+              </a:rPr>
+              <a:t> case</a:t>
+            </a:r>
+            <a:r>
+              <a:rPr lang="pt-BR" sz="2200" dirty="0">
+                <a:latin typeface="Times New Roman" panose="02020603050405020304" pitchFamily="18" charset="0"/>
+                <a:cs typeface="Times New Roman" panose="02020603050405020304" pitchFamily="18" charset="0"/>
+              </a:rPr>
+              <a:t>) – Cenário mais custoso.</a:t>
+            </a:r>
+          </a:p>
+          <a:p>
+            <a:pPr algn="just"/>
+            <a:r>
+              <a:rPr lang="pt-BR" sz="2200" b="1" dirty="0">
+                <a:latin typeface="Times New Roman" panose="02020603050405020304" pitchFamily="18" charset="0"/>
+                <a:cs typeface="Times New Roman" panose="02020603050405020304" pitchFamily="18" charset="0"/>
+              </a:rPr>
+              <a:t>Melhor caso </a:t>
+            </a:r>
+            <a:r>
+              <a:rPr lang="pt-BR" sz="2200" dirty="0">
+                <a:latin typeface="Times New Roman" panose="02020603050405020304" pitchFamily="18" charset="0"/>
+                <a:cs typeface="Times New Roman" panose="02020603050405020304" pitchFamily="18" charset="0"/>
+              </a:rPr>
+              <a:t>(</a:t>
+            </a:r>
+            <a:r>
+              <a:rPr lang="pt-BR" sz="2200" b="1" dirty="0" err="1">
+                <a:solidFill>
+                  <a:srgbClr val="FF0000"/>
+                </a:solidFill>
+                <a:latin typeface="Times New Roman" panose="02020603050405020304" pitchFamily="18" charset="0"/>
+                <a:cs typeface="Times New Roman" panose="02020603050405020304" pitchFamily="18" charset="0"/>
+              </a:rPr>
+              <a:t>best</a:t>
+            </a:r>
+            <a:r>
+              <a:rPr lang="pt-BR" sz="2200" b="1" dirty="0">
+                <a:solidFill>
+                  <a:srgbClr val="FF0000"/>
+                </a:solidFill>
+                <a:latin typeface="Times New Roman" panose="02020603050405020304" pitchFamily="18" charset="0"/>
+                <a:cs typeface="Times New Roman" panose="02020603050405020304" pitchFamily="18" charset="0"/>
+              </a:rPr>
+              <a:t> case</a:t>
+            </a:r>
+            <a:r>
+              <a:rPr lang="pt-BR" sz="2200" dirty="0">
+                <a:latin typeface="Times New Roman" panose="02020603050405020304" pitchFamily="18" charset="0"/>
+                <a:cs typeface="Times New Roman" panose="02020603050405020304" pitchFamily="18" charset="0"/>
+              </a:rPr>
+              <a:t>) – Cenário mais rápido.</a:t>
+            </a:r>
+          </a:p>
+          <a:p>
+            <a:pPr algn="just"/>
+            <a:r>
+              <a:rPr lang="pt-BR" sz="2200" b="1" dirty="0">
+                <a:latin typeface="Times New Roman" panose="02020603050405020304" pitchFamily="18" charset="0"/>
+                <a:cs typeface="Times New Roman" panose="02020603050405020304" pitchFamily="18" charset="0"/>
+              </a:rPr>
+              <a:t>Caso médio </a:t>
+            </a:r>
+            <a:r>
+              <a:rPr lang="pt-BR" sz="2200" dirty="0">
+                <a:latin typeface="Times New Roman" panose="02020603050405020304" pitchFamily="18" charset="0"/>
+                <a:cs typeface="Times New Roman" panose="02020603050405020304" pitchFamily="18" charset="0"/>
+              </a:rPr>
+              <a:t>(</a:t>
+            </a:r>
+            <a:r>
+              <a:rPr lang="pt-BR" sz="2200" b="1" dirty="0" err="1">
+                <a:solidFill>
+                  <a:srgbClr val="FF0000"/>
+                </a:solidFill>
+                <a:latin typeface="Times New Roman" panose="02020603050405020304" pitchFamily="18" charset="0"/>
+                <a:cs typeface="Times New Roman" panose="02020603050405020304" pitchFamily="18" charset="0"/>
+              </a:rPr>
+              <a:t>average</a:t>
+            </a:r>
+            <a:r>
+              <a:rPr lang="pt-BR" sz="2200" b="1" dirty="0">
+                <a:solidFill>
+                  <a:srgbClr val="FF0000"/>
+                </a:solidFill>
+                <a:latin typeface="Times New Roman" panose="02020603050405020304" pitchFamily="18" charset="0"/>
+                <a:cs typeface="Times New Roman" panose="02020603050405020304" pitchFamily="18" charset="0"/>
+              </a:rPr>
+              <a:t> case</a:t>
+            </a:r>
+            <a:r>
+              <a:rPr lang="pt-BR" sz="2200" dirty="0">
+                <a:latin typeface="Times New Roman" panose="02020603050405020304" pitchFamily="18" charset="0"/>
+                <a:cs typeface="Times New Roman" panose="02020603050405020304" pitchFamily="18" charset="0"/>
+              </a:rPr>
+              <a:t>) – </a:t>
+            </a:r>
+            <a:r>
+              <a:rPr lang="pt-BR" sz="2200" b="1" dirty="0">
+                <a:solidFill>
+                  <a:srgbClr val="FF0000"/>
+                </a:solidFill>
+                <a:latin typeface="Times New Roman" panose="02020603050405020304" pitchFamily="18" charset="0"/>
+                <a:cs typeface="Times New Roman" panose="02020603050405020304" pitchFamily="18" charset="0"/>
+              </a:rPr>
+              <a:t>Situação mais provável</a:t>
+            </a:r>
+            <a:r>
+              <a:rPr lang="pt-BR" sz="2200" dirty="0">
+                <a:latin typeface="Times New Roman" panose="02020603050405020304" pitchFamily="18" charset="0"/>
+                <a:cs typeface="Times New Roman" panose="02020603050405020304" pitchFamily="18" charset="0"/>
+              </a:rPr>
+              <a:t>.</a:t>
+            </a:r>
+            <a:endParaRPr lang="pt-BR" sz="2200" dirty="0">
+              <a:solidFill>
+                <a:schemeClr val="tx1"/>
+              </a:solidFill>
+              <a:latin typeface="Times New Roman" panose="02020603050405020304" pitchFamily="18" charset="0"/>
+              <a:cs typeface="Times New Roman" panose="02020603050405020304" pitchFamily="18" charset="0"/>
+            </a:endParaRPr>
+          </a:p>
+        </p:txBody>
+      </p:sp>
+    </p:spTree>
+    <p:extLst>
+      <p:ext uri="{BB962C8B-B14F-4D97-AF65-F5344CB8AC3E}">
+        <p14:creationId xmlns:p14="http://schemas.microsoft.com/office/powerpoint/2010/main" val="1362980025"/>
+      </p:ext>
+    </p:extLst>
+  </p:cSld>
+  <p:clrMapOvr>
+    <a:masterClrMapping/>
+  </p:clrMapOvr>
+  <p:transition spd="med"/>
+</p:sld>
+</file>
+
+<file path=ppt/slides/slide30.xml><?xml version="1.0" encoding="utf-8"?>
 <p:sld xmlns:a="http://schemas.openxmlformats.org/drawingml/2006/main" xmlns:r="http://schemas.openxmlformats.org/officeDocument/2006/relationships" xmlns:p="http://schemas.openxmlformats.org/presentationml/2006/main">
   <p:cSld>
     <p:spTree>
@@ -14513,7 +14419,7 @@
 </p:sld>
 </file>
 
-<file path=ppt/slides/slide32.xml><?xml version="1.0" encoding="utf-8"?>
+<file path=ppt/slides/slide31.xml><?xml version="1.0" encoding="utf-8"?>
 <p:sld xmlns:a="http://schemas.openxmlformats.org/drawingml/2006/main" xmlns:r="http://schemas.openxmlformats.org/officeDocument/2006/relationships" xmlns:p="http://schemas.openxmlformats.org/presentationml/2006/main">
   <p:cSld>
     <p:spTree>
@@ -14771,7 +14677,7 @@
 </p:sld>
 </file>
 
-<file path=ppt/slides/slide33.xml><?xml version="1.0" encoding="utf-8"?>
+<file path=ppt/slides/slide32.xml><?xml version="1.0" encoding="utf-8"?>
 <p:sld xmlns:a="http://schemas.openxmlformats.org/drawingml/2006/main" xmlns:r="http://schemas.openxmlformats.org/officeDocument/2006/relationships" xmlns:p="http://schemas.openxmlformats.org/presentationml/2006/main">
   <p:cSld>
     <p:spTree>
@@ -15012,7 +14918,7 @@
 </p:sld>
 </file>
 
-<file path=ppt/slides/slide34.xml><?xml version="1.0" encoding="utf-8"?>
+<file path=ppt/slides/slide33.xml><?xml version="1.0" encoding="utf-8"?>
 <p:sld xmlns:a="http://schemas.openxmlformats.org/drawingml/2006/main" xmlns:r="http://schemas.openxmlformats.org/officeDocument/2006/relationships" xmlns:p="http://schemas.openxmlformats.org/presentationml/2006/main">
   <p:cSld>
     <p:spTree>
@@ -15332,7 +15238,7 @@
 </p:sld>
 </file>
 
-<file path=ppt/slides/slide35.xml><?xml version="1.0" encoding="utf-8"?>
+<file path=ppt/slides/slide34.xml><?xml version="1.0" encoding="utf-8"?>
 <p:sld xmlns:a="http://schemas.openxmlformats.org/drawingml/2006/main" xmlns:r="http://schemas.openxmlformats.org/officeDocument/2006/relationships" xmlns:p="http://schemas.openxmlformats.org/presentationml/2006/main">
   <p:cSld>
     <p:spTree>
@@ -15551,7 +15457,7 @@
 </p:sld>
 </file>
 
-<file path=ppt/slides/slide36.xml><?xml version="1.0" encoding="utf-8"?>
+<file path=ppt/slides/slide35.xml><?xml version="1.0" encoding="utf-8"?>
 <p:sld xmlns:a="http://schemas.openxmlformats.org/drawingml/2006/main" xmlns:r="http://schemas.openxmlformats.org/officeDocument/2006/relationships" xmlns:p="http://schemas.openxmlformats.org/presentationml/2006/main">
   <p:cSld>
     <p:spTree>
@@ -15956,7 +15862,7 @@
 </p:sld>
 </file>
 
-<file path=ppt/slides/slide37.xml><?xml version="1.0" encoding="utf-8"?>
+<file path=ppt/slides/slide36.xml><?xml version="1.0" encoding="utf-8"?>
 <p:sld xmlns:a="http://schemas.openxmlformats.org/drawingml/2006/main" xmlns:r="http://schemas.openxmlformats.org/officeDocument/2006/relationships" xmlns:p="http://schemas.openxmlformats.org/presentationml/2006/main">
   <p:cSld>
     <p:spTree>
@@ -16569,7 +16475,41 @@
                 <a:latin typeface="Times New Roman" panose="02020603050405020304" pitchFamily="18" charset="0"/>
                 <a:cs typeface="Times New Roman" panose="02020603050405020304" pitchFamily="18" charset="0"/>
               </a:rPr>
-              <a:t>. Ela não mede em segundos, mas sim em ordens de crescimento.</a:t>
+              <a:t>. Ela não </a:t>
+            </a:r>
+            <a:r>
+              <a:rPr lang="pt-BR" sz="2200" b="1" dirty="0">
+                <a:solidFill>
+                  <a:srgbClr val="FF0000"/>
+                </a:solidFill>
+                <a:latin typeface="Times New Roman" panose="02020603050405020304" pitchFamily="18" charset="0"/>
+                <a:cs typeface="Times New Roman" panose="02020603050405020304" pitchFamily="18" charset="0"/>
+              </a:rPr>
+              <a:t>mede</a:t>
+            </a:r>
+            <a:r>
+              <a:rPr lang="pt-BR" sz="2200" dirty="0">
+                <a:latin typeface="Times New Roman" panose="02020603050405020304" pitchFamily="18" charset="0"/>
+                <a:cs typeface="Times New Roman" panose="02020603050405020304" pitchFamily="18" charset="0"/>
+              </a:rPr>
+              <a:t> em segundos, mas sim em </a:t>
+            </a:r>
+            <a:r>
+              <a:rPr lang="pt-BR" sz="2200" b="1" dirty="0">
+                <a:solidFill>
+                  <a:srgbClr val="FF0000"/>
+                </a:solidFill>
+                <a:latin typeface="Times New Roman" panose="02020603050405020304" pitchFamily="18" charset="0"/>
+                <a:cs typeface="Times New Roman" panose="02020603050405020304" pitchFamily="18" charset="0"/>
+              </a:rPr>
+              <a:t>ordens de crescimento</a:t>
+            </a:r>
+            <a:r>
+              <a:rPr lang="pt-BR" sz="2200" dirty="0">
+                <a:latin typeface="Times New Roman" panose="02020603050405020304" pitchFamily="18" charset="0"/>
+                <a:cs typeface="Times New Roman" panose="02020603050405020304" pitchFamily="18" charset="0"/>
+              </a:rPr>
+              <a:t>.</a:t>
             </a:r>
           </a:p>
           <a:p>
@@ -16614,10 +16554,58 @@
                 <a:latin typeface="Times New Roman" panose="02020603050405020304" pitchFamily="18" charset="0"/>
                 <a:cs typeface="Times New Roman" panose="02020603050405020304" pitchFamily="18" charset="0"/>
               </a:rPr>
-              <a:t>) se existem constantes c &gt; 0 e n₀ ≥ 0 tais que: </a:t>
+              <a:t>) se existem </a:t>
             </a:r>
             <a:r>
               <a:rPr lang="pt-BR" sz="2200" b="1" dirty="0">
+                <a:solidFill>
+                  <a:srgbClr val="FF0000"/>
+                </a:solidFill>
+                <a:latin typeface="Times New Roman" panose="02020603050405020304" pitchFamily="18" charset="0"/>
+                <a:cs typeface="Times New Roman" panose="02020603050405020304" pitchFamily="18" charset="0"/>
+              </a:rPr>
+              <a:t>constantes</a:t>
+            </a:r>
+            <a:r>
+              <a:rPr lang="pt-BR" sz="2200" dirty="0">
+                <a:latin typeface="Times New Roman" panose="02020603050405020304" pitchFamily="18" charset="0"/>
+                <a:cs typeface="Times New Roman" panose="02020603050405020304" pitchFamily="18" charset="0"/>
+              </a:rPr>
+              <a:t> </a:t>
+            </a:r>
+            <a:r>
+              <a:rPr lang="pt-BR" sz="2200" b="1" dirty="0">
+                <a:latin typeface="Times New Roman" panose="02020603050405020304" pitchFamily="18" charset="0"/>
+                <a:cs typeface="Times New Roman" panose="02020603050405020304" pitchFamily="18" charset="0"/>
+              </a:rPr>
+              <a:t>c &gt; 0 e </a:t>
+            </a:r>
+            <a:r>
+              <a:rPr lang="pt-BR" sz="2200" b="1" dirty="0">
+                <a:solidFill>
+                  <a:srgbClr val="FF0000"/>
+                </a:solidFill>
+                <a:latin typeface="Times New Roman" panose="02020603050405020304" pitchFamily="18" charset="0"/>
+                <a:cs typeface="Times New Roman" panose="02020603050405020304" pitchFamily="18" charset="0"/>
+              </a:rPr>
+              <a:t>n₀ ≥ 0</a:t>
+            </a:r>
+            <a:r>
+              <a:rPr lang="pt-BR" sz="2200" b="1" dirty="0">
+                <a:latin typeface="Times New Roman" panose="02020603050405020304" pitchFamily="18" charset="0"/>
+                <a:cs typeface="Times New Roman" panose="02020603050405020304" pitchFamily="18" charset="0"/>
+              </a:rPr>
+              <a:t> </a:t>
+            </a:r>
+            <a:r>
+              <a:rPr lang="pt-BR" sz="2200" dirty="0">
+                <a:latin typeface="Times New Roman" panose="02020603050405020304" pitchFamily="18" charset="0"/>
+                <a:cs typeface="Times New Roman" panose="02020603050405020304" pitchFamily="18" charset="0"/>
+              </a:rPr>
+              <a:t>tais que: </a:t>
+            </a:r>
+            <a:r>
+              <a:rPr lang="pt-BR" sz="2200" b="1" dirty="0">
                 <a:latin typeface="Times New Roman" panose="02020603050405020304" pitchFamily="18" charset="0"/>
                 <a:cs typeface="Times New Roman" panose="02020603050405020304" pitchFamily="18" charset="0"/>
               </a:rPr>
@@ -16628,7 +16616,38 @@
                 <a:latin typeface="Times New Roman" panose="02020603050405020304" pitchFamily="18" charset="0"/>
                 <a:cs typeface="Times New Roman" panose="02020603050405020304" pitchFamily="18" charset="0"/>
               </a:rPr>
-              <a:t>≤ c ⋅ f(n), para todo n ≥ n0,​ Onde:</a:t>
+              <a:t>≤ </a:t>
+            </a:r>
+            <a:r>
+              <a:rPr lang="pt-BR" sz="2200" b="1" dirty="0">
+                <a:solidFill>
+                  <a:srgbClr val="FF0000"/>
+                </a:solidFill>
+                <a:latin typeface="Times New Roman" panose="02020603050405020304" pitchFamily="18" charset="0"/>
+                <a:cs typeface="Times New Roman" panose="02020603050405020304" pitchFamily="18" charset="0"/>
+              </a:rPr>
+              <a:t>c ⋅ f(n), </a:t>
+            </a:r>
+            <a:r>
+              <a:rPr lang="pt-BR" sz="2200" dirty="0">
+                <a:latin typeface="Times New Roman" panose="02020603050405020304" pitchFamily="18" charset="0"/>
+                <a:cs typeface="Times New Roman" panose="02020603050405020304" pitchFamily="18" charset="0"/>
+              </a:rPr>
+              <a:t>para todo </a:t>
+            </a:r>
+            <a:r>
+              <a:rPr lang="pt-BR" sz="2200" b="1" dirty="0">
+                <a:latin typeface="Times New Roman" panose="02020603050405020304" pitchFamily="18" charset="0"/>
+                <a:cs typeface="Times New Roman" panose="02020603050405020304" pitchFamily="18" charset="0"/>
+              </a:rPr>
+              <a:t>n  ≥  n0</a:t>
+            </a:r>
+            <a:r>
+              <a:rPr lang="pt-BR" sz="2200" dirty="0">
+                <a:latin typeface="Times New Roman" panose="02020603050405020304" pitchFamily="18" charset="0"/>
+                <a:cs typeface="Times New Roman" panose="02020603050405020304" pitchFamily="18" charset="0"/>
+              </a:rPr>
+              <a:t>,​ Onde:</a:t>
             </a:r>
           </a:p>
           <a:p>
@@ -16662,7 +16681,7 @@
                 <a:latin typeface="Times New Roman" panose="02020603050405020304" pitchFamily="18" charset="0"/>
                 <a:cs typeface="Times New Roman" panose="02020603050405020304" pitchFamily="18" charset="0"/>
               </a:rPr>
-              <a:t>é a função de crescimento.</a:t>
+              <a:t>é a função de crescimento.                           </a:t>
             </a:r>
           </a:p>
           <a:p>
@@ -17185,7 +17204,7 @@
                 <a:latin typeface="Times New Roman" panose="02020603050405020304" pitchFamily="18" charset="0"/>
                 <a:cs typeface="Times New Roman" panose="02020603050405020304" pitchFamily="18" charset="0"/>
               </a:rPr>
-              <a:t>Exemplo</a:t>
+              <a:t>Exemplos</a:t>
             </a:r>
             <a:r>
               <a:rPr lang="pt-BR" sz="2200" dirty="0">
@@ -17206,11 +17225,18 @@
           </a:p>
           <a:p>
             <a:r>
-              <a:rPr lang="pt-BR" sz="2200" dirty="0">
-                <a:latin typeface="Times New Roman" panose="02020603050405020304" pitchFamily="18" charset="0"/>
-                <a:cs typeface="Times New Roman" panose="02020603050405020304" pitchFamily="18" charset="0"/>
-              </a:rPr>
-              <a:t>for (</a:t>
+              <a:rPr lang="pt-BR" sz="2200" b="1" dirty="0">
+                <a:latin typeface="Times New Roman" panose="02020603050405020304" pitchFamily="18" charset="0"/>
+                <a:cs typeface="Times New Roman" panose="02020603050405020304" pitchFamily="18" charset="0"/>
+              </a:rPr>
+              <a:t>for</a:t>
+            </a:r>
+            <a:r>
+              <a:rPr lang="pt-BR" sz="2200" dirty="0">
+                <a:latin typeface="Times New Roman" panose="02020603050405020304" pitchFamily="18" charset="0"/>
+                <a:cs typeface="Times New Roman" panose="02020603050405020304" pitchFamily="18" charset="0"/>
+              </a:rPr>
+              <a:t> (</a:t>
             </a:r>
             <a:r>
               <a:rPr lang="pt-BR" sz="2200" dirty="0" err="1">
@@ -17252,11 +17278,21 @@
           </a:p>
           <a:p>
             <a:r>
-              <a:rPr lang="pt-BR" sz="2200" dirty="0">
-                <a:latin typeface="Times New Roman" panose="02020603050405020304" pitchFamily="18" charset="0"/>
-                <a:cs typeface="Times New Roman" panose="02020603050405020304" pitchFamily="18" charset="0"/>
-              </a:rPr>
-              <a:t>for (</a:t>
+              <a:rPr lang="pt-BR" sz="2200" b="1" dirty="0">
+                <a:solidFill>
+                  <a:srgbClr val="FF0000"/>
+                </a:solidFill>
+                <a:latin typeface="Times New Roman" panose="02020603050405020304" pitchFamily="18" charset="0"/>
+                <a:cs typeface="Times New Roman" panose="02020603050405020304" pitchFamily="18" charset="0"/>
+              </a:rPr>
+              <a:t>for</a:t>
+            </a:r>
+            <a:r>
+              <a:rPr lang="pt-BR" sz="2200" dirty="0">
+                <a:latin typeface="Times New Roman" panose="02020603050405020304" pitchFamily="18" charset="0"/>
+                <a:cs typeface="Times New Roman" panose="02020603050405020304" pitchFamily="18" charset="0"/>
+              </a:rPr>
+              <a:t> (</a:t>
             </a:r>
             <a:r>
               <a:rPr lang="pt-BR" sz="2200" dirty="0" err="1">
@@ -17287,7 +17323,7 @@
                 <a:latin typeface="Times New Roman" panose="02020603050405020304" pitchFamily="18" charset="0"/>
                 <a:cs typeface="Times New Roman" panose="02020603050405020304" pitchFamily="18" charset="0"/>
               </a:rPr>
-              <a:t> → ignora para O()</a:t>
+              <a:t> → ignora para O( )</a:t>
             </a:r>
           </a:p>
           <a:p>
@@ -17437,7 +17473,24 @@
                 <a:latin typeface="Times New Roman" panose="02020603050405020304" pitchFamily="18" charset="0"/>
                 <a:cs typeface="Times New Roman" panose="02020603050405020304" pitchFamily="18" charset="0"/>
               </a:rPr>
-              <a:t>Multiplique as "dependências de n“, </a:t>
+              <a:t>Multiplique as "</a:t>
+            </a:r>
+            <a:r>
+              <a:rPr lang="pt-BR" sz="2200" b="1" dirty="0">
+                <a:solidFill>
+                  <a:srgbClr val="FF0000"/>
+                </a:solidFill>
+                <a:latin typeface="Times New Roman" panose="02020603050405020304" pitchFamily="18" charset="0"/>
+                <a:cs typeface="Times New Roman" panose="02020603050405020304" pitchFamily="18" charset="0"/>
+              </a:rPr>
+              <a:t>dependências de n</a:t>
+            </a:r>
+            <a:r>
+              <a:rPr lang="pt-BR" sz="2200" b="1" dirty="0">
+                <a:latin typeface="Times New Roman" panose="02020603050405020304" pitchFamily="18" charset="0"/>
+                <a:cs typeface="Times New Roman" panose="02020603050405020304" pitchFamily="18" charset="0"/>
+              </a:rPr>
+              <a:t>“, </a:t>
             </a:r>
             <a:r>
               <a:rPr lang="pt-BR" sz="2200" dirty="0">
@@ -17451,7 +17504,7 @@
                 <a:latin typeface="Times New Roman" panose="02020603050405020304" pitchFamily="18" charset="0"/>
                 <a:cs typeface="Times New Roman" panose="02020603050405020304" pitchFamily="18" charset="0"/>
               </a:rPr>
-              <a:t>O() </a:t>
+              <a:t>O( ) </a:t>
             </a:r>
             <a:r>
               <a:rPr lang="pt-BR" sz="2200" dirty="0">

</xml_diff>

<commit_message>
Análise Assintótica e BST e AVL 16Set2025 ...
</commit_message>
<xml_diff>
--- a/01 Classes/Aula 05 - Algoritmos e Complexidade - Notação O e Função O.pptx
+++ b/01 Classes/Aula 05 - Algoritmos e Complexidade - Notação O e Função O.pptx
@@ -16681,8 +16681,19 @@
                 <a:latin typeface="Times New Roman" panose="02020603050405020304" pitchFamily="18" charset="0"/>
                 <a:cs typeface="Times New Roman" panose="02020603050405020304" pitchFamily="18" charset="0"/>
               </a:rPr>
-              <a:t>é a função de crescimento.                           </a:t>
-            </a:r>
+              <a:t>é a função de </a:t>
+            </a:r>
+            <a:r>
+              <a:rPr lang="pt-BR" sz="2200">
+                <a:latin typeface="Times New Roman" panose="02020603050405020304" pitchFamily="18" charset="0"/>
+                <a:cs typeface="Times New Roman" panose="02020603050405020304" pitchFamily="18" charset="0"/>
+              </a:rPr>
+              <a:t>crescimento.</a:t>
+            </a:r>
+            <a:endParaRPr lang="pt-BR" sz="2200" dirty="0">
+              <a:latin typeface="Times New Roman" panose="02020603050405020304" pitchFamily="18" charset="0"/>
+              <a:cs typeface="Times New Roman" panose="02020603050405020304" pitchFamily="18" charset="0"/>
+            </a:endParaRPr>
           </a:p>
           <a:p>
             <a:pPr marL="0" indent="0" algn="just">

</xml_diff>